<commit_message>
small changes in the room configuration
</commit_message>
<xml_diff>
--- a/resources/sponsors-and-posters-portrait.pptx
+++ b/resources/sponsors-and-posters-portrait.pptx
@@ -6,7 +6,8 @@
   </p:sldMasterIdLst>
   <p:sldIdLst>
     <p:sldId id="256" r:id="rId2"/>
-    <p:sldId id="257" r:id="rId3"/>
+    <p:sldId id="258" r:id="rId3"/>
+    <p:sldId id="257" r:id="rId4"/>
   </p:sldIdLst>
   <p:sldSz cx="6858000" cy="9906000" type="A4"/>
   <p:notesSz cx="6858000" cy="9144000"/>
@@ -289,7 +290,7 @@
           <a:p>
             <a:fld id="{3FDD01AD-6846-8E41-B247-5A7569080CD0}" type="datetimeFigureOut">
               <a:rPr lang="en-US" smtClean="0"/>
-              <a:t>16/09/15</a:t>
+              <a:t>18/09/15</a:t>
             </a:fld>
             <a:endParaRPr lang="en-US"/>
           </a:p>
@@ -459,7 +460,7 @@
           <a:p>
             <a:fld id="{3FDD01AD-6846-8E41-B247-5A7569080CD0}" type="datetimeFigureOut">
               <a:rPr lang="en-US" smtClean="0"/>
-              <a:t>16/09/15</a:t>
+              <a:t>18/09/15</a:t>
             </a:fld>
             <a:endParaRPr lang="en-US"/>
           </a:p>
@@ -639,7 +640,7 @@
           <a:p>
             <a:fld id="{3FDD01AD-6846-8E41-B247-5A7569080CD0}" type="datetimeFigureOut">
               <a:rPr lang="en-US" smtClean="0"/>
-              <a:t>16/09/15</a:t>
+              <a:t>18/09/15</a:t>
             </a:fld>
             <a:endParaRPr lang="en-US"/>
           </a:p>
@@ -809,7 +810,7 @@
           <a:p>
             <a:fld id="{3FDD01AD-6846-8E41-B247-5A7569080CD0}" type="datetimeFigureOut">
               <a:rPr lang="en-US" smtClean="0"/>
-              <a:t>16/09/15</a:t>
+              <a:t>18/09/15</a:t>
             </a:fld>
             <a:endParaRPr lang="en-US"/>
           </a:p>
@@ -1055,7 +1056,7 @@
           <a:p>
             <a:fld id="{3FDD01AD-6846-8E41-B247-5A7569080CD0}" type="datetimeFigureOut">
               <a:rPr lang="en-US" smtClean="0"/>
-              <a:t>16/09/15</a:t>
+              <a:t>18/09/15</a:t>
             </a:fld>
             <a:endParaRPr lang="en-US"/>
           </a:p>
@@ -1343,7 +1344,7 @@
           <a:p>
             <a:fld id="{3FDD01AD-6846-8E41-B247-5A7569080CD0}" type="datetimeFigureOut">
               <a:rPr lang="en-US" smtClean="0"/>
-              <a:t>16/09/15</a:t>
+              <a:t>18/09/15</a:t>
             </a:fld>
             <a:endParaRPr lang="en-US"/>
           </a:p>
@@ -1770,7 +1771,7 @@
           <a:p>
             <a:fld id="{3FDD01AD-6846-8E41-B247-5A7569080CD0}" type="datetimeFigureOut">
               <a:rPr lang="en-US" smtClean="0"/>
-              <a:t>16/09/15</a:t>
+              <a:t>18/09/15</a:t>
             </a:fld>
             <a:endParaRPr lang="en-US"/>
           </a:p>
@@ -1888,7 +1889,7 @@
           <a:p>
             <a:fld id="{3FDD01AD-6846-8E41-B247-5A7569080CD0}" type="datetimeFigureOut">
               <a:rPr lang="en-US" smtClean="0"/>
-              <a:t>16/09/15</a:t>
+              <a:t>18/09/15</a:t>
             </a:fld>
             <a:endParaRPr lang="en-US"/>
           </a:p>
@@ -1983,7 +1984,7 @@
           <a:p>
             <a:fld id="{3FDD01AD-6846-8E41-B247-5A7569080CD0}" type="datetimeFigureOut">
               <a:rPr lang="en-US" smtClean="0"/>
-              <a:t>16/09/15</a:t>
+              <a:t>18/09/15</a:t>
             </a:fld>
             <a:endParaRPr lang="en-US"/>
           </a:p>
@@ -2260,7 +2261,7 @@
           <a:p>
             <a:fld id="{3FDD01AD-6846-8E41-B247-5A7569080CD0}" type="datetimeFigureOut">
               <a:rPr lang="en-US" smtClean="0"/>
-              <a:t>16/09/15</a:t>
+              <a:t>18/09/15</a:t>
             </a:fld>
             <a:endParaRPr lang="en-US"/>
           </a:p>
@@ -2513,7 +2514,7 @@
           <a:p>
             <a:fld id="{3FDD01AD-6846-8E41-B247-5A7569080CD0}" type="datetimeFigureOut">
               <a:rPr lang="en-US" smtClean="0"/>
-              <a:t>16/09/15</a:t>
+              <a:t>18/09/15</a:t>
             </a:fld>
             <a:endParaRPr lang="en-US"/>
           </a:p>
@@ -2726,7 +2727,7 @@
           <a:p>
             <a:fld id="{3FDD01AD-6846-8E41-B247-5A7569080CD0}" type="datetimeFigureOut">
               <a:rPr lang="en-US" smtClean="0"/>
-              <a:t>16/09/15</a:t>
+              <a:t>18/09/15</a:t>
             </a:fld>
             <a:endParaRPr lang="en-US"/>
           </a:p>
@@ -5618,11 +5619,7 @@
           <a:p>
             <a:r>
               <a:rPr lang="en-US" sz="700" dirty="0" smtClean="0"/>
-              <a:t>*LOUHI-</a:t>
-            </a:r>
-            <a:r>
-              <a:rPr lang="en-US" sz="700" dirty="0" smtClean="0"/>
-              <a:t>1</a:t>
+              <a:t>*LOUHI-1</a:t>
             </a:r>
             <a:endParaRPr lang="en-US" sz="700" dirty="0"/>
           </a:p>
@@ -5652,11 +5649,7 @@
           <a:p>
             <a:r>
               <a:rPr lang="en-US" sz="700" dirty="0" smtClean="0"/>
-              <a:t>LOUHI-</a:t>
-            </a:r>
-            <a:r>
-              <a:rPr lang="en-US" sz="700" dirty="0" smtClean="0"/>
-              <a:t>3*</a:t>
+              <a:t>LOUHI-3*</a:t>
             </a:r>
             <a:endParaRPr lang="en-US" sz="700" dirty="0"/>
           </a:p>
@@ -5686,11 +5679,7 @@
           <a:p>
             <a:r>
               <a:rPr lang="en-US" sz="700" dirty="0" smtClean="0"/>
-              <a:t>LOUHI-</a:t>
-            </a:r>
-            <a:r>
-              <a:rPr lang="en-US" sz="700" dirty="0" smtClean="0"/>
-              <a:t>5*</a:t>
+              <a:t>LOUHI-5*</a:t>
             </a:r>
             <a:endParaRPr lang="en-US" sz="700" dirty="0"/>
           </a:p>
@@ -5720,11 +5709,7 @@
           <a:p>
             <a:r>
               <a:rPr lang="en-US" sz="700" dirty="0" smtClean="0"/>
-              <a:t>*LOUHI-</a:t>
-            </a:r>
-            <a:r>
-              <a:rPr lang="en-US" sz="700" dirty="0" smtClean="0"/>
-              <a:t>8</a:t>
+              <a:t>*LOUHI-8</a:t>
             </a:r>
             <a:endParaRPr lang="en-US" sz="700" dirty="0"/>
           </a:p>
@@ -5754,11 +5739,7 @@
           <a:p>
             <a:r>
               <a:rPr lang="en-US" sz="700" dirty="0" smtClean="0"/>
-              <a:t>*LOUHI-</a:t>
-            </a:r>
-            <a:r>
-              <a:rPr lang="en-US" sz="700" dirty="0" smtClean="0"/>
-              <a:t>6</a:t>
+              <a:t>*LOUHI-6</a:t>
             </a:r>
             <a:endParaRPr lang="en-US" sz="700" dirty="0"/>
           </a:p>
@@ -6233,15 +6214,7 @@
             <a:pPr algn="ctr"/>
             <a:r>
               <a:rPr lang="en-US" sz="1400" dirty="0" smtClean="0"/>
-              <a:t>Friday, </a:t>
-            </a:r>
-            <a:r>
-              <a:rPr lang="en-US" sz="1400" dirty="0" smtClean="0"/>
-              <a:t>September </a:t>
-            </a:r>
-            <a:r>
-              <a:rPr lang="en-US" sz="1400" dirty="0" smtClean="0"/>
-              <a:t>20</a:t>
+              <a:t>Friday, September 20</a:t>
             </a:r>
             <a:endParaRPr lang="en-US" sz="1400" dirty="0"/>
           </a:p>
@@ -6301,11 +6274,37 @@
           <a:p>
             <a:r>
               <a:rPr lang="en-US" sz="700" dirty="0" smtClean="0"/>
-              <a:t>*WASSA-</a:t>
-            </a:r>
+              <a:t>*WASSA-1</a:t>
+            </a:r>
+            <a:endParaRPr lang="en-US" sz="700" dirty="0"/>
+          </a:p>
+        </p:txBody>
+      </p:sp>
+      <p:sp>
+        <p:nvSpPr>
+          <p:cNvPr id="196" name="TextBox 195"/>
+          <p:cNvSpPr txBox="1"/>
+          <p:nvPr/>
+        </p:nvSpPr>
+        <p:spPr>
+          <a:xfrm>
+            <a:off x="2037379" y="1553113"/>
+            <a:ext cx="569387" cy="200055"/>
+          </a:xfrm>
+          <a:prstGeom prst="rect">
+            <a:avLst/>
+          </a:prstGeom>
+          <a:noFill/>
+        </p:spPr>
+        <p:txBody>
+          <a:bodyPr wrap="none" rtlCol="0">
+            <a:spAutoFit/>
+          </a:bodyPr>
+          <a:lstStyle/>
+          <a:p>
             <a:r>
               <a:rPr lang="en-US" sz="700" dirty="0" smtClean="0"/>
-              <a:t>1</a:t>
+              <a:t>*WASSA-1</a:t>
             </a:r>
             <a:endParaRPr lang="en-US" sz="700" dirty="0"/>
           </a:p>
@@ -6325,6 +6324,3214 @@
 </file>
 
 <file path=ppt/slides/slide2.xml><?xml version="1.0" encoding="utf-8"?>
+<p:sld xmlns:a="http://schemas.openxmlformats.org/drawingml/2006/main" xmlns:r="http://schemas.openxmlformats.org/officeDocument/2006/relationships" xmlns:p="http://schemas.openxmlformats.org/presentationml/2006/main">
+  <p:cSld>
+    <p:spTree>
+      <p:nvGrpSpPr>
+        <p:cNvPr id="1" name=""/>
+        <p:cNvGrpSpPr/>
+        <p:nvPr/>
+      </p:nvGrpSpPr>
+      <p:grpSpPr>
+        <a:xfrm>
+          <a:off x="0" y="0"/>
+          <a:ext cx="0" cy="0"/>
+          <a:chOff x="0" y="0"/>
+          <a:chExt cx="0" cy="0"/>
+        </a:xfrm>
+      </p:grpSpPr>
+      <p:grpSp>
+        <p:nvGrpSpPr>
+          <p:cNvPr id="4" name="Group 3"/>
+          <p:cNvGrpSpPr/>
+          <p:nvPr/>
+        </p:nvGrpSpPr>
+        <p:grpSpPr>
+          <a:xfrm>
+            <a:off x="644923" y="581555"/>
+            <a:ext cx="5607201" cy="8038221"/>
+            <a:chOff x="4931633" y="927100"/>
+            <a:chExt cx="3944124" cy="5101590"/>
+          </a:xfrm>
+        </p:grpSpPr>
+        <p:pic>
+          <p:nvPicPr>
+            <p:cNvPr id="5" name="Picture 4"/>
+            <p:cNvPicPr>
+              <a:picLocks noChangeAspect="1"/>
+            </p:cNvPicPr>
+            <p:nvPr/>
+          </p:nvPicPr>
+          <p:blipFill>
+            <a:blip r:embed="rId2"/>
+            <a:stretch>
+              <a:fillRect/>
+            </a:stretch>
+          </p:blipFill>
+          <p:spPr>
+            <a:xfrm>
+              <a:off x="4931633" y="927100"/>
+              <a:ext cx="3822700" cy="5003800"/>
+            </a:xfrm>
+            <a:prstGeom prst="rect">
+              <a:avLst/>
+            </a:prstGeom>
+          </p:spPr>
+        </p:pic>
+        <p:sp>
+          <p:nvSpPr>
+            <p:cNvPr id="6" name="Rectangle 5"/>
+            <p:cNvSpPr/>
+            <p:nvPr/>
+          </p:nvSpPr>
+          <p:spPr>
+            <a:xfrm>
+              <a:off x="5276512" y="3563180"/>
+              <a:ext cx="394154" cy="255453"/>
+            </a:xfrm>
+            <a:prstGeom prst="rect">
+              <a:avLst/>
+            </a:prstGeom>
+            <a:ln>
+              <a:noFill/>
+            </a:ln>
+          </p:spPr>
+          <p:style>
+            <a:lnRef idx="2">
+              <a:schemeClr val="accent1"/>
+            </a:lnRef>
+            <a:fillRef idx="1">
+              <a:schemeClr val="lt1"/>
+            </a:fillRef>
+            <a:effectRef idx="0">
+              <a:schemeClr val="accent1"/>
+            </a:effectRef>
+            <a:fontRef idx="minor">
+              <a:schemeClr val="dk1"/>
+            </a:fontRef>
+          </p:style>
+          <p:txBody>
+            <a:bodyPr rtlCol="0" anchor="ctr"/>
+            <a:lstStyle/>
+            <a:p>
+              <a:pPr algn="ctr"/>
+              <a:endParaRPr lang="en-US"/>
+            </a:p>
+          </p:txBody>
+        </p:sp>
+        <p:sp>
+          <p:nvSpPr>
+            <p:cNvPr id="7" name="Rectangle 6"/>
+            <p:cNvSpPr/>
+            <p:nvPr/>
+          </p:nvSpPr>
+          <p:spPr>
+            <a:xfrm>
+              <a:off x="8481603" y="5773237"/>
+              <a:ext cx="394154" cy="255453"/>
+            </a:xfrm>
+            <a:prstGeom prst="rect">
+              <a:avLst/>
+            </a:prstGeom>
+            <a:ln>
+              <a:noFill/>
+            </a:ln>
+          </p:spPr>
+          <p:style>
+            <a:lnRef idx="2">
+              <a:schemeClr val="accent1"/>
+            </a:lnRef>
+            <a:fillRef idx="1">
+              <a:schemeClr val="lt1"/>
+            </a:fillRef>
+            <a:effectRef idx="0">
+              <a:schemeClr val="accent1"/>
+            </a:effectRef>
+            <a:fontRef idx="minor">
+              <a:schemeClr val="dk1"/>
+            </a:fontRef>
+          </p:style>
+          <p:txBody>
+            <a:bodyPr rtlCol="0" anchor="ctr"/>
+            <a:lstStyle/>
+            <a:p>
+              <a:pPr algn="ctr"/>
+              <a:endParaRPr lang="en-US"/>
+            </a:p>
+          </p:txBody>
+        </p:sp>
+      </p:grpSp>
+      <p:sp>
+        <p:nvSpPr>
+          <p:cNvPr id="8" name="TextBox 7"/>
+          <p:cNvSpPr txBox="1"/>
+          <p:nvPr/>
+        </p:nvSpPr>
+        <p:spPr>
+          <a:xfrm>
+            <a:off x="1427313" y="280458"/>
+            <a:ext cx="1352003" cy="307777"/>
+          </a:xfrm>
+          <a:prstGeom prst="rect">
+            <a:avLst/>
+          </a:prstGeom>
+          <a:noFill/>
+        </p:spPr>
+        <p:txBody>
+          <a:bodyPr wrap="none" rtlCol="0">
+            <a:spAutoFit/>
+          </a:bodyPr>
+          <a:lstStyle/>
+          <a:p>
+            <a:pPr algn="ctr"/>
+            <a:r>
+              <a:rPr lang="en-US" sz="1400" dirty="0" smtClean="0"/>
+              <a:t>Poster locations</a:t>
+            </a:r>
+            <a:endParaRPr lang="en-US" sz="1400" dirty="0"/>
+          </a:p>
+        </p:txBody>
+      </p:sp>
+      <p:sp>
+        <p:nvSpPr>
+          <p:cNvPr id="74" name="TextBox 73"/>
+          <p:cNvSpPr txBox="1"/>
+          <p:nvPr/>
+        </p:nvSpPr>
+        <p:spPr>
+          <a:xfrm>
+            <a:off x="3221243" y="273778"/>
+            <a:ext cx="1749197" cy="307777"/>
+          </a:xfrm>
+          <a:prstGeom prst="rect">
+            <a:avLst/>
+          </a:prstGeom>
+          <a:noFill/>
+        </p:spPr>
+        <p:txBody>
+          <a:bodyPr wrap="none" rtlCol="0">
+            <a:spAutoFit/>
+          </a:bodyPr>
+          <a:lstStyle/>
+          <a:p>
+            <a:pPr algn="ctr"/>
+            <a:r>
+              <a:rPr lang="en-US" sz="1400" dirty="0" smtClean="0"/>
+              <a:t>Friday, September 20</a:t>
+            </a:r>
+            <a:endParaRPr lang="en-US" sz="1400" dirty="0"/>
+          </a:p>
+        </p:txBody>
+      </p:sp>
+      <p:grpSp>
+        <p:nvGrpSpPr>
+          <p:cNvPr id="119" name="Group 118"/>
+          <p:cNvGrpSpPr/>
+          <p:nvPr/>
+        </p:nvGrpSpPr>
+        <p:grpSpPr>
+          <a:xfrm>
+            <a:off x="2718573" y="5702141"/>
+            <a:ext cx="50079" cy="510311"/>
+            <a:chOff x="2634693" y="1410960"/>
+            <a:chExt cx="50079" cy="510311"/>
+          </a:xfrm>
+        </p:grpSpPr>
+        <p:cxnSp>
+          <p:nvCxnSpPr>
+            <p:cNvPr id="92" name="Straight Connector 91"/>
+            <p:cNvCxnSpPr/>
+            <p:nvPr/>
+          </p:nvCxnSpPr>
+          <p:spPr>
+            <a:xfrm flipV="1">
+              <a:off x="2634693" y="1717147"/>
+              <a:ext cx="50079" cy="102062"/>
+            </a:xfrm>
+            <a:prstGeom prst="line">
+              <a:avLst/>
+            </a:prstGeom>
+            <a:effectLst/>
+          </p:spPr>
+          <p:style>
+            <a:lnRef idx="2">
+              <a:schemeClr val="accent1"/>
+            </a:lnRef>
+            <a:fillRef idx="0">
+              <a:schemeClr val="accent1"/>
+            </a:fillRef>
+            <a:effectRef idx="1">
+              <a:schemeClr val="accent1"/>
+            </a:effectRef>
+            <a:fontRef idx="minor">
+              <a:schemeClr val="tx1"/>
+            </a:fontRef>
+          </p:style>
+        </p:cxnSp>
+        <p:cxnSp>
+          <p:nvCxnSpPr>
+            <p:cNvPr id="93" name="Straight Connector 92"/>
+            <p:cNvCxnSpPr/>
+            <p:nvPr/>
+          </p:nvCxnSpPr>
+          <p:spPr>
+            <a:xfrm>
+              <a:off x="2634693" y="1819209"/>
+              <a:ext cx="50079" cy="102062"/>
+            </a:xfrm>
+            <a:prstGeom prst="line">
+              <a:avLst/>
+            </a:prstGeom>
+            <a:effectLst/>
+          </p:spPr>
+          <p:style>
+            <a:lnRef idx="2">
+              <a:schemeClr val="accent1"/>
+            </a:lnRef>
+            <a:fillRef idx="0">
+              <a:schemeClr val="accent1"/>
+            </a:fillRef>
+            <a:effectRef idx="1">
+              <a:schemeClr val="accent1"/>
+            </a:effectRef>
+            <a:fontRef idx="minor">
+              <a:schemeClr val="tx1"/>
+            </a:fontRef>
+          </p:style>
+        </p:cxnSp>
+        <p:cxnSp>
+          <p:nvCxnSpPr>
+            <p:cNvPr id="94" name="Straight Connector 93"/>
+            <p:cNvCxnSpPr/>
+            <p:nvPr/>
+          </p:nvCxnSpPr>
+          <p:spPr>
+            <a:xfrm>
+              <a:off x="2634693" y="1615084"/>
+              <a:ext cx="50079" cy="102062"/>
+            </a:xfrm>
+            <a:prstGeom prst="line">
+              <a:avLst/>
+            </a:prstGeom>
+            <a:effectLst/>
+          </p:spPr>
+          <p:style>
+            <a:lnRef idx="2">
+              <a:schemeClr val="accent1"/>
+            </a:lnRef>
+            <a:fillRef idx="0">
+              <a:schemeClr val="accent1"/>
+            </a:fillRef>
+            <a:effectRef idx="1">
+              <a:schemeClr val="accent1"/>
+            </a:effectRef>
+            <a:fontRef idx="minor">
+              <a:schemeClr val="tx1"/>
+            </a:fontRef>
+          </p:style>
+        </p:cxnSp>
+        <p:cxnSp>
+          <p:nvCxnSpPr>
+            <p:cNvPr id="95" name="Straight Connector 94"/>
+            <p:cNvCxnSpPr/>
+            <p:nvPr/>
+          </p:nvCxnSpPr>
+          <p:spPr>
+            <a:xfrm>
+              <a:off x="2634693" y="1410960"/>
+              <a:ext cx="50079" cy="102062"/>
+            </a:xfrm>
+            <a:prstGeom prst="line">
+              <a:avLst/>
+            </a:prstGeom>
+            <a:effectLst/>
+          </p:spPr>
+          <p:style>
+            <a:lnRef idx="2">
+              <a:schemeClr val="accent1"/>
+            </a:lnRef>
+            <a:fillRef idx="0">
+              <a:schemeClr val="accent1"/>
+            </a:fillRef>
+            <a:effectRef idx="1">
+              <a:schemeClr val="accent1"/>
+            </a:effectRef>
+            <a:fontRef idx="minor">
+              <a:schemeClr val="tx1"/>
+            </a:fontRef>
+          </p:style>
+        </p:cxnSp>
+        <p:cxnSp>
+          <p:nvCxnSpPr>
+            <p:cNvPr id="96" name="Straight Connector 95"/>
+            <p:cNvCxnSpPr/>
+            <p:nvPr/>
+          </p:nvCxnSpPr>
+          <p:spPr>
+            <a:xfrm flipV="1">
+              <a:off x="2634693" y="1513022"/>
+              <a:ext cx="50079" cy="102062"/>
+            </a:xfrm>
+            <a:prstGeom prst="line">
+              <a:avLst/>
+            </a:prstGeom>
+            <a:effectLst/>
+          </p:spPr>
+          <p:style>
+            <a:lnRef idx="2">
+              <a:schemeClr val="accent1"/>
+            </a:lnRef>
+            <a:fillRef idx="0">
+              <a:schemeClr val="accent1"/>
+            </a:fillRef>
+            <a:effectRef idx="1">
+              <a:schemeClr val="accent1"/>
+            </a:effectRef>
+            <a:fontRef idx="minor">
+              <a:schemeClr val="tx1"/>
+            </a:fontRef>
+          </p:style>
+        </p:cxnSp>
+      </p:grpSp>
+      <p:grpSp>
+        <p:nvGrpSpPr>
+          <p:cNvPr id="110" name="Group 109"/>
+          <p:cNvGrpSpPr/>
+          <p:nvPr/>
+        </p:nvGrpSpPr>
+        <p:grpSpPr>
+          <a:xfrm>
+            <a:off x="3113546" y="5006368"/>
+            <a:ext cx="50079" cy="510311"/>
+            <a:chOff x="1900727" y="1195216"/>
+            <a:chExt cx="50079" cy="510311"/>
+          </a:xfrm>
+        </p:grpSpPr>
+        <p:cxnSp>
+          <p:nvCxnSpPr>
+            <p:cNvPr id="99" name="Straight Connector 98"/>
+            <p:cNvCxnSpPr/>
+            <p:nvPr/>
+          </p:nvCxnSpPr>
+          <p:spPr>
+            <a:xfrm flipV="1">
+              <a:off x="1900727" y="1603465"/>
+              <a:ext cx="50079" cy="102062"/>
+            </a:xfrm>
+            <a:prstGeom prst="line">
+              <a:avLst/>
+            </a:prstGeom>
+            <a:effectLst/>
+          </p:spPr>
+          <p:style>
+            <a:lnRef idx="2">
+              <a:schemeClr val="accent1"/>
+            </a:lnRef>
+            <a:fillRef idx="0">
+              <a:schemeClr val="accent1"/>
+            </a:fillRef>
+            <a:effectRef idx="1">
+              <a:schemeClr val="accent1"/>
+            </a:effectRef>
+            <a:fontRef idx="minor">
+              <a:schemeClr val="tx1"/>
+            </a:fontRef>
+          </p:style>
+        </p:cxnSp>
+        <p:cxnSp>
+          <p:nvCxnSpPr>
+            <p:cNvPr id="100" name="Straight Connector 99"/>
+            <p:cNvCxnSpPr/>
+            <p:nvPr/>
+          </p:nvCxnSpPr>
+          <p:spPr>
+            <a:xfrm flipV="1">
+              <a:off x="1900727" y="1399341"/>
+              <a:ext cx="50079" cy="102062"/>
+            </a:xfrm>
+            <a:prstGeom prst="line">
+              <a:avLst/>
+            </a:prstGeom>
+            <a:effectLst/>
+          </p:spPr>
+          <p:style>
+            <a:lnRef idx="2">
+              <a:schemeClr val="accent1"/>
+            </a:lnRef>
+            <a:fillRef idx="0">
+              <a:schemeClr val="accent1"/>
+            </a:fillRef>
+            <a:effectRef idx="1">
+              <a:schemeClr val="accent1"/>
+            </a:effectRef>
+            <a:fontRef idx="minor">
+              <a:schemeClr val="tx1"/>
+            </a:fontRef>
+          </p:style>
+        </p:cxnSp>
+        <p:cxnSp>
+          <p:nvCxnSpPr>
+            <p:cNvPr id="101" name="Straight Connector 100"/>
+            <p:cNvCxnSpPr/>
+            <p:nvPr/>
+          </p:nvCxnSpPr>
+          <p:spPr>
+            <a:xfrm>
+              <a:off x="1900727" y="1501403"/>
+              <a:ext cx="50079" cy="102062"/>
+            </a:xfrm>
+            <a:prstGeom prst="line">
+              <a:avLst/>
+            </a:prstGeom>
+            <a:effectLst/>
+          </p:spPr>
+          <p:style>
+            <a:lnRef idx="2">
+              <a:schemeClr val="accent1"/>
+            </a:lnRef>
+            <a:fillRef idx="0">
+              <a:schemeClr val="accent1"/>
+            </a:fillRef>
+            <a:effectRef idx="1">
+              <a:schemeClr val="accent1"/>
+            </a:effectRef>
+            <a:fontRef idx="minor">
+              <a:schemeClr val="tx1"/>
+            </a:fontRef>
+          </p:style>
+        </p:cxnSp>
+        <p:cxnSp>
+          <p:nvCxnSpPr>
+            <p:cNvPr id="102" name="Straight Connector 101"/>
+            <p:cNvCxnSpPr/>
+            <p:nvPr/>
+          </p:nvCxnSpPr>
+          <p:spPr>
+            <a:xfrm>
+              <a:off x="1900727" y="1297278"/>
+              <a:ext cx="50079" cy="102062"/>
+            </a:xfrm>
+            <a:prstGeom prst="line">
+              <a:avLst/>
+            </a:prstGeom>
+            <a:effectLst/>
+          </p:spPr>
+          <p:style>
+            <a:lnRef idx="2">
+              <a:schemeClr val="accent1"/>
+            </a:lnRef>
+            <a:fillRef idx="0">
+              <a:schemeClr val="accent1"/>
+            </a:fillRef>
+            <a:effectRef idx="1">
+              <a:schemeClr val="accent1"/>
+            </a:effectRef>
+            <a:fontRef idx="minor">
+              <a:schemeClr val="tx1"/>
+            </a:fontRef>
+          </p:style>
+        </p:cxnSp>
+        <p:cxnSp>
+          <p:nvCxnSpPr>
+            <p:cNvPr id="104" name="Straight Connector 103"/>
+            <p:cNvCxnSpPr/>
+            <p:nvPr/>
+          </p:nvCxnSpPr>
+          <p:spPr>
+            <a:xfrm flipV="1">
+              <a:off x="1900727" y="1195216"/>
+              <a:ext cx="50079" cy="102062"/>
+            </a:xfrm>
+            <a:prstGeom prst="line">
+              <a:avLst/>
+            </a:prstGeom>
+            <a:effectLst/>
+          </p:spPr>
+          <p:style>
+            <a:lnRef idx="2">
+              <a:schemeClr val="accent1"/>
+            </a:lnRef>
+            <a:fillRef idx="0">
+              <a:schemeClr val="accent1"/>
+            </a:fillRef>
+            <a:effectRef idx="1">
+              <a:schemeClr val="accent1"/>
+            </a:effectRef>
+            <a:fontRef idx="minor">
+              <a:schemeClr val="tx1"/>
+            </a:fontRef>
+          </p:style>
+        </p:cxnSp>
+      </p:grpSp>
+      <p:grpSp>
+        <p:nvGrpSpPr>
+          <p:cNvPr id="111" name="Group 110"/>
+          <p:cNvGrpSpPr/>
+          <p:nvPr/>
+        </p:nvGrpSpPr>
+        <p:grpSpPr>
+          <a:xfrm>
+            <a:off x="1894107" y="1401765"/>
+            <a:ext cx="50079" cy="408249"/>
+            <a:chOff x="1894107" y="1833417"/>
+            <a:chExt cx="50079" cy="408249"/>
+          </a:xfrm>
+        </p:grpSpPr>
+        <p:cxnSp>
+          <p:nvCxnSpPr>
+            <p:cNvPr id="105" name="Straight Connector 104"/>
+            <p:cNvCxnSpPr/>
+            <p:nvPr/>
+          </p:nvCxnSpPr>
+          <p:spPr>
+            <a:xfrm flipV="1">
+              <a:off x="1894107" y="2139604"/>
+              <a:ext cx="50079" cy="102062"/>
+            </a:xfrm>
+            <a:prstGeom prst="line">
+              <a:avLst/>
+            </a:prstGeom>
+            <a:effectLst/>
+          </p:spPr>
+          <p:style>
+            <a:lnRef idx="2">
+              <a:schemeClr val="accent1"/>
+            </a:lnRef>
+            <a:fillRef idx="0">
+              <a:schemeClr val="accent1"/>
+            </a:fillRef>
+            <a:effectRef idx="1">
+              <a:schemeClr val="accent1"/>
+            </a:effectRef>
+            <a:fontRef idx="minor">
+              <a:schemeClr val="tx1"/>
+            </a:fontRef>
+          </p:style>
+        </p:cxnSp>
+        <p:cxnSp>
+          <p:nvCxnSpPr>
+            <p:cNvPr id="106" name="Straight Connector 105"/>
+            <p:cNvCxnSpPr/>
+            <p:nvPr/>
+          </p:nvCxnSpPr>
+          <p:spPr>
+            <a:xfrm flipV="1">
+              <a:off x="1894107" y="1935480"/>
+              <a:ext cx="50079" cy="102062"/>
+            </a:xfrm>
+            <a:prstGeom prst="line">
+              <a:avLst/>
+            </a:prstGeom>
+            <a:effectLst/>
+          </p:spPr>
+          <p:style>
+            <a:lnRef idx="2">
+              <a:schemeClr val="accent1"/>
+            </a:lnRef>
+            <a:fillRef idx="0">
+              <a:schemeClr val="accent1"/>
+            </a:fillRef>
+            <a:effectRef idx="1">
+              <a:schemeClr val="accent1"/>
+            </a:effectRef>
+            <a:fontRef idx="minor">
+              <a:schemeClr val="tx1"/>
+            </a:fontRef>
+          </p:style>
+        </p:cxnSp>
+        <p:cxnSp>
+          <p:nvCxnSpPr>
+            <p:cNvPr id="107" name="Straight Connector 106"/>
+            <p:cNvCxnSpPr/>
+            <p:nvPr/>
+          </p:nvCxnSpPr>
+          <p:spPr>
+            <a:xfrm>
+              <a:off x="1894107" y="2037542"/>
+              <a:ext cx="50079" cy="102062"/>
+            </a:xfrm>
+            <a:prstGeom prst="line">
+              <a:avLst/>
+            </a:prstGeom>
+            <a:effectLst/>
+          </p:spPr>
+          <p:style>
+            <a:lnRef idx="2">
+              <a:schemeClr val="accent1"/>
+            </a:lnRef>
+            <a:fillRef idx="0">
+              <a:schemeClr val="accent1"/>
+            </a:fillRef>
+            <a:effectRef idx="1">
+              <a:schemeClr val="accent1"/>
+            </a:effectRef>
+            <a:fontRef idx="minor">
+              <a:schemeClr val="tx1"/>
+            </a:fontRef>
+          </p:style>
+        </p:cxnSp>
+        <p:cxnSp>
+          <p:nvCxnSpPr>
+            <p:cNvPr id="108" name="Straight Connector 107"/>
+            <p:cNvCxnSpPr/>
+            <p:nvPr/>
+          </p:nvCxnSpPr>
+          <p:spPr>
+            <a:xfrm>
+              <a:off x="1894107" y="1833417"/>
+              <a:ext cx="50079" cy="102062"/>
+            </a:xfrm>
+            <a:prstGeom prst="line">
+              <a:avLst/>
+            </a:prstGeom>
+            <a:effectLst/>
+          </p:spPr>
+          <p:style>
+            <a:lnRef idx="2">
+              <a:schemeClr val="accent1"/>
+            </a:lnRef>
+            <a:fillRef idx="0">
+              <a:schemeClr val="accent1"/>
+            </a:fillRef>
+            <a:effectRef idx="1">
+              <a:schemeClr val="accent1"/>
+            </a:effectRef>
+            <a:fontRef idx="minor">
+              <a:schemeClr val="tx1"/>
+            </a:fontRef>
+          </p:style>
+        </p:cxnSp>
+      </p:grpSp>
+      <p:grpSp>
+        <p:nvGrpSpPr>
+          <p:cNvPr id="118" name="Group 117"/>
+          <p:cNvGrpSpPr/>
+          <p:nvPr/>
+        </p:nvGrpSpPr>
+        <p:grpSpPr>
+          <a:xfrm>
+            <a:off x="3119269" y="1436864"/>
+            <a:ext cx="50079" cy="408249"/>
+            <a:chOff x="2634693" y="2473984"/>
+            <a:chExt cx="50079" cy="408249"/>
+          </a:xfrm>
+        </p:grpSpPr>
+        <p:cxnSp>
+          <p:nvCxnSpPr>
+            <p:cNvPr id="113" name="Straight Connector 112"/>
+            <p:cNvCxnSpPr/>
+            <p:nvPr/>
+          </p:nvCxnSpPr>
+          <p:spPr>
+            <a:xfrm flipV="1">
+              <a:off x="2634693" y="2678109"/>
+              <a:ext cx="50079" cy="102062"/>
+            </a:xfrm>
+            <a:prstGeom prst="line">
+              <a:avLst/>
+            </a:prstGeom>
+            <a:effectLst/>
+          </p:spPr>
+          <p:style>
+            <a:lnRef idx="2">
+              <a:schemeClr val="accent1"/>
+            </a:lnRef>
+            <a:fillRef idx="0">
+              <a:schemeClr val="accent1"/>
+            </a:fillRef>
+            <a:effectRef idx="1">
+              <a:schemeClr val="accent1"/>
+            </a:effectRef>
+            <a:fontRef idx="minor">
+              <a:schemeClr val="tx1"/>
+            </a:fontRef>
+          </p:style>
+        </p:cxnSp>
+        <p:cxnSp>
+          <p:nvCxnSpPr>
+            <p:cNvPr id="114" name="Straight Connector 113"/>
+            <p:cNvCxnSpPr/>
+            <p:nvPr/>
+          </p:nvCxnSpPr>
+          <p:spPr>
+            <a:xfrm>
+              <a:off x="2634693" y="2780171"/>
+              <a:ext cx="50079" cy="102062"/>
+            </a:xfrm>
+            <a:prstGeom prst="line">
+              <a:avLst/>
+            </a:prstGeom>
+            <a:effectLst/>
+          </p:spPr>
+          <p:style>
+            <a:lnRef idx="2">
+              <a:schemeClr val="accent1"/>
+            </a:lnRef>
+            <a:fillRef idx="0">
+              <a:schemeClr val="accent1"/>
+            </a:fillRef>
+            <a:effectRef idx="1">
+              <a:schemeClr val="accent1"/>
+            </a:effectRef>
+            <a:fontRef idx="minor">
+              <a:schemeClr val="tx1"/>
+            </a:fontRef>
+          </p:style>
+        </p:cxnSp>
+        <p:cxnSp>
+          <p:nvCxnSpPr>
+            <p:cNvPr id="115" name="Straight Connector 114"/>
+            <p:cNvCxnSpPr/>
+            <p:nvPr/>
+          </p:nvCxnSpPr>
+          <p:spPr>
+            <a:xfrm>
+              <a:off x="2634693" y="2576046"/>
+              <a:ext cx="50079" cy="102062"/>
+            </a:xfrm>
+            <a:prstGeom prst="line">
+              <a:avLst/>
+            </a:prstGeom>
+            <a:effectLst/>
+          </p:spPr>
+          <p:style>
+            <a:lnRef idx="2">
+              <a:schemeClr val="accent1"/>
+            </a:lnRef>
+            <a:fillRef idx="0">
+              <a:schemeClr val="accent1"/>
+            </a:fillRef>
+            <a:effectRef idx="1">
+              <a:schemeClr val="accent1"/>
+            </a:effectRef>
+            <a:fontRef idx="minor">
+              <a:schemeClr val="tx1"/>
+            </a:fontRef>
+          </p:style>
+        </p:cxnSp>
+        <p:cxnSp>
+          <p:nvCxnSpPr>
+            <p:cNvPr id="117" name="Straight Connector 116"/>
+            <p:cNvCxnSpPr/>
+            <p:nvPr/>
+          </p:nvCxnSpPr>
+          <p:spPr>
+            <a:xfrm flipV="1">
+              <a:off x="2634693" y="2473984"/>
+              <a:ext cx="50079" cy="102062"/>
+            </a:xfrm>
+            <a:prstGeom prst="line">
+              <a:avLst/>
+            </a:prstGeom>
+            <a:effectLst/>
+          </p:spPr>
+          <p:style>
+            <a:lnRef idx="2">
+              <a:schemeClr val="accent1"/>
+            </a:lnRef>
+            <a:fillRef idx="0">
+              <a:schemeClr val="accent1"/>
+            </a:fillRef>
+            <a:effectRef idx="1">
+              <a:schemeClr val="accent1"/>
+            </a:effectRef>
+            <a:fontRef idx="minor">
+              <a:schemeClr val="tx1"/>
+            </a:fontRef>
+          </p:style>
+        </p:cxnSp>
+      </p:grpSp>
+      <p:grpSp>
+        <p:nvGrpSpPr>
+          <p:cNvPr id="120" name="Group 119"/>
+          <p:cNvGrpSpPr/>
+          <p:nvPr/>
+        </p:nvGrpSpPr>
+        <p:grpSpPr>
+          <a:xfrm>
+            <a:off x="2886254" y="834150"/>
+            <a:ext cx="50079" cy="510311"/>
+            <a:chOff x="1900727" y="1195216"/>
+            <a:chExt cx="50079" cy="510311"/>
+          </a:xfrm>
+        </p:grpSpPr>
+        <p:cxnSp>
+          <p:nvCxnSpPr>
+            <p:cNvPr id="121" name="Straight Connector 120"/>
+            <p:cNvCxnSpPr/>
+            <p:nvPr/>
+          </p:nvCxnSpPr>
+          <p:spPr>
+            <a:xfrm flipV="1">
+              <a:off x="1900727" y="1603465"/>
+              <a:ext cx="50079" cy="102062"/>
+            </a:xfrm>
+            <a:prstGeom prst="line">
+              <a:avLst/>
+            </a:prstGeom>
+            <a:effectLst/>
+          </p:spPr>
+          <p:style>
+            <a:lnRef idx="2">
+              <a:schemeClr val="accent1"/>
+            </a:lnRef>
+            <a:fillRef idx="0">
+              <a:schemeClr val="accent1"/>
+            </a:fillRef>
+            <a:effectRef idx="1">
+              <a:schemeClr val="accent1"/>
+            </a:effectRef>
+            <a:fontRef idx="minor">
+              <a:schemeClr val="tx1"/>
+            </a:fontRef>
+          </p:style>
+        </p:cxnSp>
+        <p:cxnSp>
+          <p:nvCxnSpPr>
+            <p:cNvPr id="122" name="Straight Connector 121"/>
+            <p:cNvCxnSpPr/>
+            <p:nvPr/>
+          </p:nvCxnSpPr>
+          <p:spPr>
+            <a:xfrm flipV="1">
+              <a:off x="1900727" y="1399341"/>
+              <a:ext cx="50079" cy="102062"/>
+            </a:xfrm>
+            <a:prstGeom prst="line">
+              <a:avLst/>
+            </a:prstGeom>
+            <a:effectLst/>
+          </p:spPr>
+          <p:style>
+            <a:lnRef idx="2">
+              <a:schemeClr val="accent1"/>
+            </a:lnRef>
+            <a:fillRef idx="0">
+              <a:schemeClr val="accent1"/>
+            </a:fillRef>
+            <a:effectRef idx="1">
+              <a:schemeClr val="accent1"/>
+            </a:effectRef>
+            <a:fontRef idx="minor">
+              <a:schemeClr val="tx1"/>
+            </a:fontRef>
+          </p:style>
+        </p:cxnSp>
+        <p:cxnSp>
+          <p:nvCxnSpPr>
+            <p:cNvPr id="123" name="Straight Connector 122"/>
+            <p:cNvCxnSpPr/>
+            <p:nvPr/>
+          </p:nvCxnSpPr>
+          <p:spPr>
+            <a:xfrm>
+              <a:off x="1900727" y="1501403"/>
+              <a:ext cx="50079" cy="102062"/>
+            </a:xfrm>
+            <a:prstGeom prst="line">
+              <a:avLst/>
+            </a:prstGeom>
+            <a:effectLst/>
+          </p:spPr>
+          <p:style>
+            <a:lnRef idx="2">
+              <a:schemeClr val="accent1"/>
+            </a:lnRef>
+            <a:fillRef idx="0">
+              <a:schemeClr val="accent1"/>
+            </a:fillRef>
+            <a:effectRef idx="1">
+              <a:schemeClr val="accent1"/>
+            </a:effectRef>
+            <a:fontRef idx="minor">
+              <a:schemeClr val="tx1"/>
+            </a:fontRef>
+          </p:style>
+        </p:cxnSp>
+        <p:cxnSp>
+          <p:nvCxnSpPr>
+            <p:cNvPr id="124" name="Straight Connector 123"/>
+            <p:cNvCxnSpPr/>
+            <p:nvPr/>
+          </p:nvCxnSpPr>
+          <p:spPr>
+            <a:xfrm>
+              <a:off x="1900727" y="1297278"/>
+              <a:ext cx="50079" cy="102062"/>
+            </a:xfrm>
+            <a:prstGeom prst="line">
+              <a:avLst/>
+            </a:prstGeom>
+            <a:effectLst/>
+          </p:spPr>
+          <p:style>
+            <a:lnRef idx="2">
+              <a:schemeClr val="accent1"/>
+            </a:lnRef>
+            <a:fillRef idx="0">
+              <a:schemeClr val="accent1"/>
+            </a:fillRef>
+            <a:effectRef idx="1">
+              <a:schemeClr val="accent1"/>
+            </a:effectRef>
+            <a:fontRef idx="minor">
+              <a:schemeClr val="tx1"/>
+            </a:fontRef>
+          </p:style>
+        </p:cxnSp>
+        <p:cxnSp>
+          <p:nvCxnSpPr>
+            <p:cNvPr id="125" name="Straight Connector 124"/>
+            <p:cNvCxnSpPr/>
+            <p:nvPr/>
+          </p:nvCxnSpPr>
+          <p:spPr>
+            <a:xfrm flipV="1">
+              <a:off x="1900727" y="1195216"/>
+              <a:ext cx="50079" cy="102062"/>
+            </a:xfrm>
+            <a:prstGeom prst="line">
+              <a:avLst/>
+            </a:prstGeom>
+            <a:effectLst/>
+          </p:spPr>
+          <p:style>
+            <a:lnRef idx="2">
+              <a:schemeClr val="accent1"/>
+            </a:lnRef>
+            <a:fillRef idx="0">
+              <a:schemeClr val="accent1"/>
+            </a:fillRef>
+            <a:effectRef idx="1">
+              <a:schemeClr val="accent1"/>
+            </a:effectRef>
+            <a:fontRef idx="minor">
+              <a:schemeClr val="tx1"/>
+            </a:fontRef>
+          </p:style>
+        </p:cxnSp>
+      </p:grpSp>
+      <p:grpSp>
+        <p:nvGrpSpPr>
+          <p:cNvPr id="126" name="Group 125"/>
+          <p:cNvGrpSpPr/>
+          <p:nvPr/>
+        </p:nvGrpSpPr>
+        <p:grpSpPr>
+          <a:xfrm>
+            <a:off x="1894107" y="834150"/>
+            <a:ext cx="50079" cy="510311"/>
+            <a:chOff x="1900727" y="1195216"/>
+            <a:chExt cx="50079" cy="510311"/>
+          </a:xfrm>
+        </p:grpSpPr>
+        <p:cxnSp>
+          <p:nvCxnSpPr>
+            <p:cNvPr id="127" name="Straight Connector 126"/>
+            <p:cNvCxnSpPr/>
+            <p:nvPr/>
+          </p:nvCxnSpPr>
+          <p:spPr>
+            <a:xfrm flipV="1">
+              <a:off x="1900727" y="1603465"/>
+              <a:ext cx="50079" cy="102062"/>
+            </a:xfrm>
+            <a:prstGeom prst="line">
+              <a:avLst/>
+            </a:prstGeom>
+            <a:effectLst/>
+          </p:spPr>
+          <p:style>
+            <a:lnRef idx="2">
+              <a:schemeClr val="accent1"/>
+            </a:lnRef>
+            <a:fillRef idx="0">
+              <a:schemeClr val="accent1"/>
+            </a:fillRef>
+            <a:effectRef idx="1">
+              <a:schemeClr val="accent1"/>
+            </a:effectRef>
+            <a:fontRef idx="minor">
+              <a:schemeClr val="tx1"/>
+            </a:fontRef>
+          </p:style>
+        </p:cxnSp>
+        <p:cxnSp>
+          <p:nvCxnSpPr>
+            <p:cNvPr id="128" name="Straight Connector 127"/>
+            <p:cNvCxnSpPr/>
+            <p:nvPr/>
+          </p:nvCxnSpPr>
+          <p:spPr>
+            <a:xfrm flipV="1">
+              <a:off x="1900727" y="1399341"/>
+              <a:ext cx="50079" cy="102062"/>
+            </a:xfrm>
+            <a:prstGeom prst="line">
+              <a:avLst/>
+            </a:prstGeom>
+            <a:effectLst/>
+          </p:spPr>
+          <p:style>
+            <a:lnRef idx="2">
+              <a:schemeClr val="accent1"/>
+            </a:lnRef>
+            <a:fillRef idx="0">
+              <a:schemeClr val="accent1"/>
+            </a:fillRef>
+            <a:effectRef idx="1">
+              <a:schemeClr val="accent1"/>
+            </a:effectRef>
+            <a:fontRef idx="minor">
+              <a:schemeClr val="tx1"/>
+            </a:fontRef>
+          </p:style>
+        </p:cxnSp>
+        <p:cxnSp>
+          <p:nvCxnSpPr>
+            <p:cNvPr id="129" name="Straight Connector 128"/>
+            <p:cNvCxnSpPr/>
+            <p:nvPr/>
+          </p:nvCxnSpPr>
+          <p:spPr>
+            <a:xfrm>
+              <a:off x="1900727" y="1501403"/>
+              <a:ext cx="50079" cy="102062"/>
+            </a:xfrm>
+            <a:prstGeom prst="line">
+              <a:avLst/>
+            </a:prstGeom>
+            <a:effectLst/>
+          </p:spPr>
+          <p:style>
+            <a:lnRef idx="2">
+              <a:schemeClr val="accent1"/>
+            </a:lnRef>
+            <a:fillRef idx="0">
+              <a:schemeClr val="accent1"/>
+            </a:fillRef>
+            <a:effectRef idx="1">
+              <a:schemeClr val="accent1"/>
+            </a:effectRef>
+            <a:fontRef idx="minor">
+              <a:schemeClr val="tx1"/>
+            </a:fontRef>
+          </p:style>
+        </p:cxnSp>
+        <p:cxnSp>
+          <p:nvCxnSpPr>
+            <p:cNvPr id="130" name="Straight Connector 129"/>
+            <p:cNvCxnSpPr/>
+            <p:nvPr/>
+          </p:nvCxnSpPr>
+          <p:spPr>
+            <a:xfrm>
+              <a:off x="1900727" y="1297278"/>
+              <a:ext cx="50079" cy="102062"/>
+            </a:xfrm>
+            <a:prstGeom prst="line">
+              <a:avLst/>
+            </a:prstGeom>
+            <a:effectLst/>
+          </p:spPr>
+          <p:style>
+            <a:lnRef idx="2">
+              <a:schemeClr val="accent1"/>
+            </a:lnRef>
+            <a:fillRef idx="0">
+              <a:schemeClr val="accent1"/>
+            </a:fillRef>
+            <a:effectRef idx="1">
+              <a:schemeClr val="accent1"/>
+            </a:effectRef>
+            <a:fontRef idx="minor">
+              <a:schemeClr val="tx1"/>
+            </a:fontRef>
+          </p:style>
+        </p:cxnSp>
+        <p:cxnSp>
+          <p:nvCxnSpPr>
+            <p:cNvPr id="131" name="Straight Connector 130"/>
+            <p:cNvCxnSpPr/>
+            <p:nvPr/>
+          </p:nvCxnSpPr>
+          <p:spPr>
+            <a:xfrm flipV="1">
+              <a:off x="1900727" y="1195216"/>
+              <a:ext cx="50079" cy="102062"/>
+            </a:xfrm>
+            <a:prstGeom prst="line">
+              <a:avLst/>
+            </a:prstGeom>
+            <a:effectLst/>
+          </p:spPr>
+          <p:style>
+            <a:lnRef idx="2">
+              <a:schemeClr val="accent1"/>
+            </a:lnRef>
+            <a:fillRef idx="0">
+              <a:schemeClr val="accent1"/>
+            </a:fillRef>
+            <a:effectRef idx="1">
+              <a:schemeClr val="accent1"/>
+            </a:effectRef>
+            <a:fontRef idx="minor">
+              <a:schemeClr val="tx1"/>
+            </a:fontRef>
+          </p:style>
+        </p:cxnSp>
+      </p:grpSp>
+      <p:grpSp>
+        <p:nvGrpSpPr>
+          <p:cNvPr id="132" name="Group 131"/>
+          <p:cNvGrpSpPr/>
+          <p:nvPr/>
+        </p:nvGrpSpPr>
+        <p:grpSpPr>
+          <a:xfrm>
+            <a:off x="2290063" y="1114228"/>
+            <a:ext cx="50079" cy="408249"/>
+            <a:chOff x="1894107" y="1833417"/>
+            <a:chExt cx="50079" cy="408249"/>
+          </a:xfrm>
+        </p:grpSpPr>
+        <p:cxnSp>
+          <p:nvCxnSpPr>
+            <p:cNvPr id="133" name="Straight Connector 132"/>
+            <p:cNvCxnSpPr/>
+            <p:nvPr/>
+          </p:nvCxnSpPr>
+          <p:spPr>
+            <a:xfrm flipV="1">
+              <a:off x="1894107" y="2139604"/>
+              <a:ext cx="50079" cy="102062"/>
+            </a:xfrm>
+            <a:prstGeom prst="line">
+              <a:avLst/>
+            </a:prstGeom>
+            <a:effectLst/>
+          </p:spPr>
+          <p:style>
+            <a:lnRef idx="2">
+              <a:schemeClr val="accent1"/>
+            </a:lnRef>
+            <a:fillRef idx="0">
+              <a:schemeClr val="accent1"/>
+            </a:fillRef>
+            <a:effectRef idx="1">
+              <a:schemeClr val="accent1"/>
+            </a:effectRef>
+            <a:fontRef idx="minor">
+              <a:schemeClr val="tx1"/>
+            </a:fontRef>
+          </p:style>
+        </p:cxnSp>
+        <p:cxnSp>
+          <p:nvCxnSpPr>
+            <p:cNvPr id="134" name="Straight Connector 133"/>
+            <p:cNvCxnSpPr/>
+            <p:nvPr/>
+          </p:nvCxnSpPr>
+          <p:spPr>
+            <a:xfrm flipV="1">
+              <a:off x="1894107" y="1935480"/>
+              <a:ext cx="50079" cy="102062"/>
+            </a:xfrm>
+            <a:prstGeom prst="line">
+              <a:avLst/>
+            </a:prstGeom>
+            <a:effectLst/>
+          </p:spPr>
+          <p:style>
+            <a:lnRef idx="2">
+              <a:schemeClr val="accent1"/>
+            </a:lnRef>
+            <a:fillRef idx="0">
+              <a:schemeClr val="accent1"/>
+            </a:fillRef>
+            <a:effectRef idx="1">
+              <a:schemeClr val="accent1"/>
+            </a:effectRef>
+            <a:fontRef idx="minor">
+              <a:schemeClr val="tx1"/>
+            </a:fontRef>
+          </p:style>
+        </p:cxnSp>
+        <p:cxnSp>
+          <p:nvCxnSpPr>
+            <p:cNvPr id="135" name="Straight Connector 134"/>
+            <p:cNvCxnSpPr/>
+            <p:nvPr/>
+          </p:nvCxnSpPr>
+          <p:spPr>
+            <a:xfrm>
+              <a:off x="1894107" y="2037542"/>
+              <a:ext cx="50079" cy="102062"/>
+            </a:xfrm>
+            <a:prstGeom prst="line">
+              <a:avLst/>
+            </a:prstGeom>
+            <a:effectLst/>
+          </p:spPr>
+          <p:style>
+            <a:lnRef idx="2">
+              <a:schemeClr val="accent1"/>
+            </a:lnRef>
+            <a:fillRef idx="0">
+              <a:schemeClr val="accent1"/>
+            </a:fillRef>
+            <a:effectRef idx="1">
+              <a:schemeClr val="accent1"/>
+            </a:effectRef>
+            <a:fontRef idx="minor">
+              <a:schemeClr val="tx1"/>
+            </a:fontRef>
+          </p:style>
+        </p:cxnSp>
+        <p:cxnSp>
+          <p:nvCxnSpPr>
+            <p:cNvPr id="136" name="Straight Connector 135"/>
+            <p:cNvCxnSpPr/>
+            <p:nvPr/>
+          </p:nvCxnSpPr>
+          <p:spPr>
+            <a:xfrm>
+              <a:off x="1894107" y="1833417"/>
+              <a:ext cx="50079" cy="102062"/>
+            </a:xfrm>
+            <a:prstGeom prst="line">
+              <a:avLst/>
+            </a:prstGeom>
+            <a:effectLst/>
+          </p:spPr>
+          <p:style>
+            <a:lnRef idx="2">
+              <a:schemeClr val="accent1"/>
+            </a:lnRef>
+            <a:fillRef idx="0">
+              <a:schemeClr val="accent1"/>
+            </a:fillRef>
+            <a:effectRef idx="1">
+              <a:schemeClr val="accent1"/>
+            </a:effectRef>
+            <a:fontRef idx="minor">
+              <a:schemeClr val="tx1"/>
+            </a:fontRef>
+          </p:style>
+        </p:cxnSp>
+      </p:grpSp>
+      <p:grpSp>
+        <p:nvGrpSpPr>
+          <p:cNvPr id="137" name="Group 136"/>
+          <p:cNvGrpSpPr/>
+          <p:nvPr/>
+        </p:nvGrpSpPr>
+        <p:grpSpPr>
+          <a:xfrm>
+            <a:off x="2290063" y="1640988"/>
+            <a:ext cx="50079" cy="408249"/>
+            <a:chOff x="2634693" y="2473984"/>
+            <a:chExt cx="50079" cy="408249"/>
+          </a:xfrm>
+        </p:grpSpPr>
+        <p:cxnSp>
+          <p:nvCxnSpPr>
+            <p:cNvPr id="138" name="Straight Connector 137"/>
+            <p:cNvCxnSpPr/>
+            <p:nvPr/>
+          </p:nvCxnSpPr>
+          <p:spPr>
+            <a:xfrm flipV="1">
+              <a:off x="2634693" y="2678109"/>
+              <a:ext cx="50079" cy="102062"/>
+            </a:xfrm>
+            <a:prstGeom prst="line">
+              <a:avLst/>
+            </a:prstGeom>
+            <a:effectLst/>
+          </p:spPr>
+          <p:style>
+            <a:lnRef idx="2">
+              <a:schemeClr val="accent1"/>
+            </a:lnRef>
+            <a:fillRef idx="0">
+              <a:schemeClr val="accent1"/>
+            </a:fillRef>
+            <a:effectRef idx="1">
+              <a:schemeClr val="accent1"/>
+            </a:effectRef>
+            <a:fontRef idx="minor">
+              <a:schemeClr val="tx1"/>
+            </a:fontRef>
+          </p:style>
+        </p:cxnSp>
+        <p:cxnSp>
+          <p:nvCxnSpPr>
+            <p:cNvPr id="139" name="Straight Connector 138"/>
+            <p:cNvCxnSpPr/>
+            <p:nvPr/>
+          </p:nvCxnSpPr>
+          <p:spPr>
+            <a:xfrm>
+              <a:off x="2634693" y="2780171"/>
+              <a:ext cx="50079" cy="102062"/>
+            </a:xfrm>
+            <a:prstGeom prst="line">
+              <a:avLst/>
+            </a:prstGeom>
+            <a:effectLst/>
+          </p:spPr>
+          <p:style>
+            <a:lnRef idx="2">
+              <a:schemeClr val="accent1"/>
+            </a:lnRef>
+            <a:fillRef idx="0">
+              <a:schemeClr val="accent1"/>
+            </a:fillRef>
+            <a:effectRef idx="1">
+              <a:schemeClr val="accent1"/>
+            </a:effectRef>
+            <a:fontRef idx="minor">
+              <a:schemeClr val="tx1"/>
+            </a:fontRef>
+          </p:style>
+        </p:cxnSp>
+        <p:cxnSp>
+          <p:nvCxnSpPr>
+            <p:cNvPr id="140" name="Straight Connector 139"/>
+            <p:cNvCxnSpPr/>
+            <p:nvPr/>
+          </p:nvCxnSpPr>
+          <p:spPr>
+            <a:xfrm>
+              <a:off x="2634693" y="2576046"/>
+              <a:ext cx="50079" cy="102062"/>
+            </a:xfrm>
+            <a:prstGeom prst="line">
+              <a:avLst/>
+            </a:prstGeom>
+            <a:effectLst/>
+          </p:spPr>
+          <p:style>
+            <a:lnRef idx="2">
+              <a:schemeClr val="accent1"/>
+            </a:lnRef>
+            <a:fillRef idx="0">
+              <a:schemeClr val="accent1"/>
+            </a:fillRef>
+            <a:effectRef idx="1">
+              <a:schemeClr val="accent1"/>
+            </a:effectRef>
+            <a:fontRef idx="minor">
+              <a:schemeClr val="tx1"/>
+            </a:fontRef>
+          </p:style>
+        </p:cxnSp>
+        <p:cxnSp>
+          <p:nvCxnSpPr>
+            <p:cNvPr id="141" name="Straight Connector 140"/>
+            <p:cNvCxnSpPr/>
+            <p:nvPr/>
+          </p:nvCxnSpPr>
+          <p:spPr>
+            <a:xfrm flipV="1">
+              <a:off x="2634693" y="2473984"/>
+              <a:ext cx="50079" cy="102062"/>
+            </a:xfrm>
+            <a:prstGeom prst="line">
+              <a:avLst/>
+            </a:prstGeom>
+            <a:effectLst/>
+          </p:spPr>
+          <p:style>
+            <a:lnRef idx="2">
+              <a:schemeClr val="accent1"/>
+            </a:lnRef>
+            <a:fillRef idx="0">
+              <a:schemeClr val="accent1"/>
+            </a:fillRef>
+            <a:effectRef idx="1">
+              <a:schemeClr val="accent1"/>
+            </a:effectRef>
+            <a:fontRef idx="minor">
+              <a:schemeClr val="tx1"/>
+            </a:fontRef>
+          </p:style>
+        </p:cxnSp>
+      </p:grpSp>
+      <p:grpSp>
+        <p:nvGrpSpPr>
+          <p:cNvPr id="142" name="Group 141"/>
+          <p:cNvGrpSpPr/>
+          <p:nvPr/>
+        </p:nvGrpSpPr>
+        <p:grpSpPr>
+          <a:xfrm>
+            <a:off x="2271994" y="2157686"/>
+            <a:ext cx="50079" cy="408249"/>
+            <a:chOff x="2634693" y="2473984"/>
+            <a:chExt cx="50079" cy="408249"/>
+          </a:xfrm>
+        </p:grpSpPr>
+        <p:cxnSp>
+          <p:nvCxnSpPr>
+            <p:cNvPr id="143" name="Straight Connector 142"/>
+            <p:cNvCxnSpPr/>
+            <p:nvPr/>
+          </p:nvCxnSpPr>
+          <p:spPr>
+            <a:xfrm flipV="1">
+              <a:off x="2634693" y="2678109"/>
+              <a:ext cx="50079" cy="102062"/>
+            </a:xfrm>
+            <a:prstGeom prst="line">
+              <a:avLst/>
+            </a:prstGeom>
+            <a:effectLst/>
+          </p:spPr>
+          <p:style>
+            <a:lnRef idx="2">
+              <a:schemeClr val="accent1"/>
+            </a:lnRef>
+            <a:fillRef idx="0">
+              <a:schemeClr val="accent1"/>
+            </a:fillRef>
+            <a:effectRef idx="1">
+              <a:schemeClr val="accent1"/>
+            </a:effectRef>
+            <a:fontRef idx="minor">
+              <a:schemeClr val="tx1"/>
+            </a:fontRef>
+          </p:style>
+        </p:cxnSp>
+        <p:cxnSp>
+          <p:nvCxnSpPr>
+            <p:cNvPr id="144" name="Straight Connector 143"/>
+            <p:cNvCxnSpPr/>
+            <p:nvPr/>
+          </p:nvCxnSpPr>
+          <p:spPr>
+            <a:xfrm>
+              <a:off x="2634693" y="2780171"/>
+              <a:ext cx="50079" cy="102062"/>
+            </a:xfrm>
+            <a:prstGeom prst="line">
+              <a:avLst/>
+            </a:prstGeom>
+            <a:effectLst/>
+          </p:spPr>
+          <p:style>
+            <a:lnRef idx="2">
+              <a:schemeClr val="accent1"/>
+            </a:lnRef>
+            <a:fillRef idx="0">
+              <a:schemeClr val="accent1"/>
+            </a:fillRef>
+            <a:effectRef idx="1">
+              <a:schemeClr val="accent1"/>
+            </a:effectRef>
+            <a:fontRef idx="minor">
+              <a:schemeClr val="tx1"/>
+            </a:fontRef>
+          </p:style>
+        </p:cxnSp>
+        <p:cxnSp>
+          <p:nvCxnSpPr>
+            <p:cNvPr id="145" name="Straight Connector 144"/>
+            <p:cNvCxnSpPr/>
+            <p:nvPr/>
+          </p:nvCxnSpPr>
+          <p:spPr>
+            <a:xfrm>
+              <a:off x="2634693" y="2576046"/>
+              <a:ext cx="50079" cy="102062"/>
+            </a:xfrm>
+            <a:prstGeom prst="line">
+              <a:avLst/>
+            </a:prstGeom>
+            <a:effectLst/>
+          </p:spPr>
+          <p:style>
+            <a:lnRef idx="2">
+              <a:schemeClr val="accent1"/>
+            </a:lnRef>
+            <a:fillRef idx="0">
+              <a:schemeClr val="accent1"/>
+            </a:fillRef>
+            <a:effectRef idx="1">
+              <a:schemeClr val="accent1"/>
+            </a:effectRef>
+            <a:fontRef idx="minor">
+              <a:schemeClr val="tx1"/>
+            </a:fontRef>
+          </p:style>
+        </p:cxnSp>
+        <p:cxnSp>
+          <p:nvCxnSpPr>
+            <p:cNvPr id="146" name="Straight Connector 145"/>
+            <p:cNvCxnSpPr/>
+            <p:nvPr/>
+          </p:nvCxnSpPr>
+          <p:spPr>
+            <a:xfrm flipV="1">
+              <a:off x="2634693" y="2473984"/>
+              <a:ext cx="50079" cy="102062"/>
+            </a:xfrm>
+            <a:prstGeom prst="line">
+              <a:avLst/>
+            </a:prstGeom>
+            <a:effectLst/>
+          </p:spPr>
+          <p:style>
+            <a:lnRef idx="2">
+              <a:schemeClr val="accent1"/>
+            </a:lnRef>
+            <a:fillRef idx="0">
+              <a:schemeClr val="accent1"/>
+            </a:fillRef>
+            <a:effectRef idx="1">
+              <a:schemeClr val="accent1"/>
+            </a:effectRef>
+            <a:fontRef idx="minor">
+              <a:schemeClr val="tx1"/>
+            </a:fontRef>
+          </p:style>
+        </p:cxnSp>
+      </p:grpSp>
+      <p:grpSp>
+        <p:nvGrpSpPr>
+          <p:cNvPr id="147" name="Group 146"/>
+          <p:cNvGrpSpPr/>
+          <p:nvPr/>
+        </p:nvGrpSpPr>
+        <p:grpSpPr>
+          <a:xfrm rot="5400000">
+            <a:off x="4405046" y="5575039"/>
+            <a:ext cx="50079" cy="408249"/>
+            <a:chOff x="1894107" y="1833417"/>
+            <a:chExt cx="50079" cy="408249"/>
+          </a:xfrm>
+        </p:grpSpPr>
+        <p:cxnSp>
+          <p:nvCxnSpPr>
+            <p:cNvPr id="148" name="Straight Connector 147"/>
+            <p:cNvCxnSpPr/>
+            <p:nvPr/>
+          </p:nvCxnSpPr>
+          <p:spPr>
+            <a:xfrm flipV="1">
+              <a:off x="1894107" y="2139604"/>
+              <a:ext cx="50079" cy="102062"/>
+            </a:xfrm>
+            <a:prstGeom prst="line">
+              <a:avLst/>
+            </a:prstGeom>
+            <a:effectLst/>
+          </p:spPr>
+          <p:style>
+            <a:lnRef idx="2">
+              <a:schemeClr val="accent1"/>
+            </a:lnRef>
+            <a:fillRef idx="0">
+              <a:schemeClr val="accent1"/>
+            </a:fillRef>
+            <a:effectRef idx="1">
+              <a:schemeClr val="accent1"/>
+            </a:effectRef>
+            <a:fontRef idx="minor">
+              <a:schemeClr val="tx1"/>
+            </a:fontRef>
+          </p:style>
+        </p:cxnSp>
+        <p:cxnSp>
+          <p:nvCxnSpPr>
+            <p:cNvPr id="149" name="Straight Connector 148"/>
+            <p:cNvCxnSpPr/>
+            <p:nvPr/>
+          </p:nvCxnSpPr>
+          <p:spPr>
+            <a:xfrm flipV="1">
+              <a:off x="1894107" y="1935480"/>
+              <a:ext cx="50079" cy="102062"/>
+            </a:xfrm>
+            <a:prstGeom prst="line">
+              <a:avLst/>
+            </a:prstGeom>
+            <a:effectLst/>
+          </p:spPr>
+          <p:style>
+            <a:lnRef idx="2">
+              <a:schemeClr val="accent1"/>
+            </a:lnRef>
+            <a:fillRef idx="0">
+              <a:schemeClr val="accent1"/>
+            </a:fillRef>
+            <a:effectRef idx="1">
+              <a:schemeClr val="accent1"/>
+            </a:effectRef>
+            <a:fontRef idx="minor">
+              <a:schemeClr val="tx1"/>
+            </a:fontRef>
+          </p:style>
+        </p:cxnSp>
+        <p:cxnSp>
+          <p:nvCxnSpPr>
+            <p:cNvPr id="150" name="Straight Connector 149"/>
+            <p:cNvCxnSpPr/>
+            <p:nvPr/>
+          </p:nvCxnSpPr>
+          <p:spPr>
+            <a:xfrm>
+              <a:off x="1894107" y="2037542"/>
+              <a:ext cx="50079" cy="102062"/>
+            </a:xfrm>
+            <a:prstGeom prst="line">
+              <a:avLst/>
+            </a:prstGeom>
+            <a:effectLst/>
+          </p:spPr>
+          <p:style>
+            <a:lnRef idx="2">
+              <a:schemeClr val="accent1"/>
+            </a:lnRef>
+            <a:fillRef idx="0">
+              <a:schemeClr val="accent1"/>
+            </a:fillRef>
+            <a:effectRef idx="1">
+              <a:schemeClr val="accent1"/>
+            </a:effectRef>
+            <a:fontRef idx="minor">
+              <a:schemeClr val="tx1"/>
+            </a:fontRef>
+          </p:style>
+        </p:cxnSp>
+        <p:cxnSp>
+          <p:nvCxnSpPr>
+            <p:cNvPr id="151" name="Straight Connector 150"/>
+            <p:cNvCxnSpPr/>
+            <p:nvPr/>
+          </p:nvCxnSpPr>
+          <p:spPr>
+            <a:xfrm>
+              <a:off x="1894107" y="1833417"/>
+              <a:ext cx="50079" cy="102062"/>
+            </a:xfrm>
+            <a:prstGeom prst="line">
+              <a:avLst/>
+            </a:prstGeom>
+            <a:effectLst/>
+          </p:spPr>
+          <p:style>
+            <a:lnRef idx="2">
+              <a:schemeClr val="accent1"/>
+            </a:lnRef>
+            <a:fillRef idx="0">
+              <a:schemeClr val="accent1"/>
+            </a:fillRef>
+            <a:effectRef idx="1">
+              <a:schemeClr val="accent1"/>
+            </a:effectRef>
+            <a:fontRef idx="minor">
+              <a:schemeClr val="tx1"/>
+            </a:fontRef>
+          </p:style>
+        </p:cxnSp>
+      </p:grpSp>
+      <p:grpSp>
+        <p:nvGrpSpPr>
+          <p:cNvPr id="152" name="Group 151"/>
+          <p:cNvGrpSpPr/>
+          <p:nvPr/>
+        </p:nvGrpSpPr>
+        <p:grpSpPr>
+          <a:xfrm rot="5400000">
+            <a:off x="3941488" y="5575039"/>
+            <a:ext cx="50079" cy="408249"/>
+            <a:chOff x="1894107" y="1833417"/>
+            <a:chExt cx="50079" cy="408249"/>
+          </a:xfrm>
+        </p:grpSpPr>
+        <p:cxnSp>
+          <p:nvCxnSpPr>
+            <p:cNvPr id="153" name="Straight Connector 152"/>
+            <p:cNvCxnSpPr/>
+            <p:nvPr/>
+          </p:nvCxnSpPr>
+          <p:spPr>
+            <a:xfrm flipV="1">
+              <a:off x="1894107" y="2139604"/>
+              <a:ext cx="50079" cy="102062"/>
+            </a:xfrm>
+            <a:prstGeom prst="line">
+              <a:avLst/>
+            </a:prstGeom>
+            <a:effectLst/>
+          </p:spPr>
+          <p:style>
+            <a:lnRef idx="2">
+              <a:schemeClr val="accent1"/>
+            </a:lnRef>
+            <a:fillRef idx="0">
+              <a:schemeClr val="accent1"/>
+            </a:fillRef>
+            <a:effectRef idx="1">
+              <a:schemeClr val="accent1"/>
+            </a:effectRef>
+            <a:fontRef idx="minor">
+              <a:schemeClr val="tx1"/>
+            </a:fontRef>
+          </p:style>
+        </p:cxnSp>
+        <p:cxnSp>
+          <p:nvCxnSpPr>
+            <p:cNvPr id="154" name="Straight Connector 153"/>
+            <p:cNvCxnSpPr/>
+            <p:nvPr/>
+          </p:nvCxnSpPr>
+          <p:spPr>
+            <a:xfrm flipV="1">
+              <a:off x="1894107" y="1935480"/>
+              <a:ext cx="50079" cy="102062"/>
+            </a:xfrm>
+            <a:prstGeom prst="line">
+              <a:avLst/>
+            </a:prstGeom>
+            <a:effectLst/>
+          </p:spPr>
+          <p:style>
+            <a:lnRef idx="2">
+              <a:schemeClr val="accent1"/>
+            </a:lnRef>
+            <a:fillRef idx="0">
+              <a:schemeClr val="accent1"/>
+            </a:fillRef>
+            <a:effectRef idx="1">
+              <a:schemeClr val="accent1"/>
+            </a:effectRef>
+            <a:fontRef idx="minor">
+              <a:schemeClr val="tx1"/>
+            </a:fontRef>
+          </p:style>
+        </p:cxnSp>
+        <p:cxnSp>
+          <p:nvCxnSpPr>
+            <p:cNvPr id="155" name="Straight Connector 154"/>
+            <p:cNvCxnSpPr/>
+            <p:nvPr/>
+          </p:nvCxnSpPr>
+          <p:spPr>
+            <a:xfrm>
+              <a:off x="1894107" y="2037542"/>
+              <a:ext cx="50079" cy="102062"/>
+            </a:xfrm>
+            <a:prstGeom prst="line">
+              <a:avLst/>
+            </a:prstGeom>
+            <a:effectLst/>
+          </p:spPr>
+          <p:style>
+            <a:lnRef idx="2">
+              <a:schemeClr val="accent1"/>
+            </a:lnRef>
+            <a:fillRef idx="0">
+              <a:schemeClr val="accent1"/>
+            </a:fillRef>
+            <a:effectRef idx="1">
+              <a:schemeClr val="accent1"/>
+            </a:effectRef>
+            <a:fontRef idx="minor">
+              <a:schemeClr val="tx1"/>
+            </a:fontRef>
+          </p:style>
+        </p:cxnSp>
+        <p:cxnSp>
+          <p:nvCxnSpPr>
+            <p:cNvPr id="156" name="Straight Connector 155"/>
+            <p:cNvCxnSpPr/>
+            <p:nvPr/>
+          </p:nvCxnSpPr>
+          <p:spPr>
+            <a:xfrm>
+              <a:off x="1894107" y="1833417"/>
+              <a:ext cx="50079" cy="102062"/>
+            </a:xfrm>
+            <a:prstGeom prst="line">
+              <a:avLst/>
+            </a:prstGeom>
+            <a:effectLst/>
+          </p:spPr>
+          <p:style>
+            <a:lnRef idx="2">
+              <a:schemeClr val="accent1"/>
+            </a:lnRef>
+            <a:fillRef idx="0">
+              <a:schemeClr val="accent1"/>
+            </a:fillRef>
+            <a:effectRef idx="1">
+              <a:schemeClr val="accent1"/>
+            </a:effectRef>
+            <a:fontRef idx="minor">
+              <a:schemeClr val="tx1"/>
+            </a:fontRef>
+          </p:style>
+        </p:cxnSp>
+      </p:grpSp>
+      <p:grpSp>
+        <p:nvGrpSpPr>
+          <p:cNvPr id="157" name="Group 156"/>
+          <p:cNvGrpSpPr/>
+          <p:nvPr/>
+        </p:nvGrpSpPr>
+        <p:grpSpPr>
+          <a:xfrm>
+            <a:off x="2663927" y="1453827"/>
+            <a:ext cx="50079" cy="408249"/>
+            <a:chOff x="2634693" y="2473984"/>
+            <a:chExt cx="50079" cy="408249"/>
+          </a:xfrm>
+        </p:grpSpPr>
+        <p:cxnSp>
+          <p:nvCxnSpPr>
+            <p:cNvPr id="158" name="Straight Connector 157"/>
+            <p:cNvCxnSpPr/>
+            <p:nvPr/>
+          </p:nvCxnSpPr>
+          <p:spPr>
+            <a:xfrm flipV="1">
+              <a:off x="2634693" y="2678109"/>
+              <a:ext cx="50079" cy="102062"/>
+            </a:xfrm>
+            <a:prstGeom prst="line">
+              <a:avLst/>
+            </a:prstGeom>
+            <a:effectLst/>
+          </p:spPr>
+          <p:style>
+            <a:lnRef idx="2">
+              <a:schemeClr val="accent1"/>
+            </a:lnRef>
+            <a:fillRef idx="0">
+              <a:schemeClr val="accent1"/>
+            </a:fillRef>
+            <a:effectRef idx="1">
+              <a:schemeClr val="accent1"/>
+            </a:effectRef>
+            <a:fontRef idx="minor">
+              <a:schemeClr val="tx1"/>
+            </a:fontRef>
+          </p:style>
+        </p:cxnSp>
+        <p:cxnSp>
+          <p:nvCxnSpPr>
+            <p:cNvPr id="159" name="Straight Connector 158"/>
+            <p:cNvCxnSpPr/>
+            <p:nvPr/>
+          </p:nvCxnSpPr>
+          <p:spPr>
+            <a:xfrm>
+              <a:off x="2634693" y="2780171"/>
+              <a:ext cx="50079" cy="102062"/>
+            </a:xfrm>
+            <a:prstGeom prst="line">
+              <a:avLst/>
+            </a:prstGeom>
+            <a:effectLst/>
+          </p:spPr>
+          <p:style>
+            <a:lnRef idx="2">
+              <a:schemeClr val="accent1"/>
+            </a:lnRef>
+            <a:fillRef idx="0">
+              <a:schemeClr val="accent1"/>
+            </a:fillRef>
+            <a:effectRef idx="1">
+              <a:schemeClr val="accent1"/>
+            </a:effectRef>
+            <a:fontRef idx="minor">
+              <a:schemeClr val="tx1"/>
+            </a:fontRef>
+          </p:style>
+        </p:cxnSp>
+        <p:cxnSp>
+          <p:nvCxnSpPr>
+            <p:cNvPr id="160" name="Straight Connector 159"/>
+            <p:cNvCxnSpPr/>
+            <p:nvPr/>
+          </p:nvCxnSpPr>
+          <p:spPr>
+            <a:xfrm>
+              <a:off x="2634693" y="2576046"/>
+              <a:ext cx="50079" cy="102062"/>
+            </a:xfrm>
+            <a:prstGeom prst="line">
+              <a:avLst/>
+            </a:prstGeom>
+            <a:effectLst/>
+          </p:spPr>
+          <p:style>
+            <a:lnRef idx="2">
+              <a:schemeClr val="accent1"/>
+            </a:lnRef>
+            <a:fillRef idx="0">
+              <a:schemeClr val="accent1"/>
+            </a:fillRef>
+            <a:effectRef idx="1">
+              <a:schemeClr val="accent1"/>
+            </a:effectRef>
+            <a:fontRef idx="minor">
+              <a:schemeClr val="tx1"/>
+            </a:fontRef>
+          </p:style>
+        </p:cxnSp>
+        <p:cxnSp>
+          <p:nvCxnSpPr>
+            <p:cNvPr id="161" name="Straight Connector 160"/>
+            <p:cNvCxnSpPr/>
+            <p:nvPr/>
+          </p:nvCxnSpPr>
+          <p:spPr>
+            <a:xfrm flipV="1">
+              <a:off x="2634693" y="2473984"/>
+              <a:ext cx="50079" cy="102062"/>
+            </a:xfrm>
+            <a:prstGeom prst="line">
+              <a:avLst/>
+            </a:prstGeom>
+            <a:effectLst/>
+          </p:spPr>
+          <p:style>
+            <a:lnRef idx="2">
+              <a:schemeClr val="accent1"/>
+            </a:lnRef>
+            <a:fillRef idx="0">
+              <a:schemeClr val="accent1"/>
+            </a:fillRef>
+            <a:effectRef idx="1">
+              <a:schemeClr val="accent1"/>
+            </a:effectRef>
+            <a:fontRef idx="minor">
+              <a:schemeClr val="tx1"/>
+            </a:fontRef>
+          </p:style>
+        </p:cxnSp>
+      </p:grpSp>
+      <p:grpSp>
+        <p:nvGrpSpPr>
+          <p:cNvPr id="162" name="Group 161"/>
+          <p:cNvGrpSpPr/>
+          <p:nvPr/>
+        </p:nvGrpSpPr>
+        <p:grpSpPr>
+          <a:xfrm>
+            <a:off x="1894107" y="5108430"/>
+            <a:ext cx="50079" cy="408249"/>
+            <a:chOff x="1894107" y="1833417"/>
+            <a:chExt cx="50079" cy="408249"/>
+          </a:xfrm>
+        </p:grpSpPr>
+        <p:cxnSp>
+          <p:nvCxnSpPr>
+            <p:cNvPr id="163" name="Straight Connector 162"/>
+            <p:cNvCxnSpPr/>
+            <p:nvPr/>
+          </p:nvCxnSpPr>
+          <p:spPr>
+            <a:xfrm flipV="1">
+              <a:off x="1894107" y="2139604"/>
+              <a:ext cx="50079" cy="102062"/>
+            </a:xfrm>
+            <a:prstGeom prst="line">
+              <a:avLst/>
+            </a:prstGeom>
+            <a:effectLst/>
+          </p:spPr>
+          <p:style>
+            <a:lnRef idx="2">
+              <a:schemeClr val="accent1"/>
+            </a:lnRef>
+            <a:fillRef idx="0">
+              <a:schemeClr val="accent1"/>
+            </a:fillRef>
+            <a:effectRef idx="1">
+              <a:schemeClr val="accent1"/>
+            </a:effectRef>
+            <a:fontRef idx="minor">
+              <a:schemeClr val="tx1"/>
+            </a:fontRef>
+          </p:style>
+        </p:cxnSp>
+        <p:cxnSp>
+          <p:nvCxnSpPr>
+            <p:cNvPr id="164" name="Straight Connector 163"/>
+            <p:cNvCxnSpPr/>
+            <p:nvPr/>
+          </p:nvCxnSpPr>
+          <p:spPr>
+            <a:xfrm flipV="1">
+              <a:off x="1894107" y="1935480"/>
+              <a:ext cx="50079" cy="102062"/>
+            </a:xfrm>
+            <a:prstGeom prst="line">
+              <a:avLst/>
+            </a:prstGeom>
+            <a:effectLst/>
+          </p:spPr>
+          <p:style>
+            <a:lnRef idx="2">
+              <a:schemeClr val="accent1"/>
+            </a:lnRef>
+            <a:fillRef idx="0">
+              <a:schemeClr val="accent1"/>
+            </a:fillRef>
+            <a:effectRef idx="1">
+              <a:schemeClr val="accent1"/>
+            </a:effectRef>
+            <a:fontRef idx="minor">
+              <a:schemeClr val="tx1"/>
+            </a:fontRef>
+          </p:style>
+        </p:cxnSp>
+        <p:cxnSp>
+          <p:nvCxnSpPr>
+            <p:cNvPr id="165" name="Straight Connector 164"/>
+            <p:cNvCxnSpPr/>
+            <p:nvPr/>
+          </p:nvCxnSpPr>
+          <p:spPr>
+            <a:xfrm>
+              <a:off x="1894107" y="2037542"/>
+              <a:ext cx="50079" cy="102062"/>
+            </a:xfrm>
+            <a:prstGeom prst="line">
+              <a:avLst/>
+            </a:prstGeom>
+            <a:effectLst/>
+          </p:spPr>
+          <p:style>
+            <a:lnRef idx="2">
+              <a:schemeClr val="accent1"/>
+            </a:lnRef>
+            <a:fillRef idx="0">
+              <a:schemeClr val="accent1"/>
+            </a:fillRef>
+            <a:effectRef idx="1">
+              <a:schemeClr val="accent1"/>
+            </a:effectRef>
+            <a:fontRef idx="minor">
+              <a:schemeClr val="tx1"/>
+            </a:fontRef>
+          </p:style>
+        </p:cxnSp>
+        <p:cxnSp>
+          <p:nvCxnSpPr>
+            <p:cNvPr id="166" name="Straight Connector 165"/>
+            <p:cNvCxnSpPr/>
+            <p:nvPr/>
+          </p:nvCxnSpPr>
+          <p:spPr>
+            <a:xfrm>
+              <a:off x="1894107" y="1833417"/>
+              <a:ext cx="50079" cy="102062"/>
+            </a:xfrm>
+            <a:prstGeom prst="line">
+              <a:avLst/>
+            </a:prstGeom>
+            <a:effectLst/>
+          </p:spPr>
+          <p:style>
+            <a:lnRef idx="2">
+              <a:schemeClr val="accent1"/>
+            </a:lnRef>
+            <a:fillRef idx="0">
+              <a:schemeClr val="accent1"/>
+            </a:fillRef>
+            <a:effectRef idx="1">
+              <a:schemeClr val="accent1"/>
+            </a:effectRef>
+            <a:fontRef idx="minor">
+              <a:schemeClr val="tx1"/>
+            </a:fontRef>
+          </p:style>
+        </p:cxnSp>
+      </p:grpSp>
+      <p:grpSp>
+        <p:nvGrpSpPr>
+          <p:cNvPr id="167" name="Group 166"/>
+          <p:cNvGrpSpPr/>
+          <p:nvPr/>
+        </p:nvGrpSpPr>
+        <p:grpSpPr>
+          <a:xfrm>
+            <a:off x="1894107" y="4530918"/>
+            <a:ext cx="50079" cy="408249"/>
+            <a:chOff x="1894107" y="1833417"/>
+            <a:chExt cx="50079" cy="408249"/>
+          </a:xfrm>
+        </p:grpSpPr>
+        <p:cxnSp>
+          <p:nvCxnSpPr>
+            <p:cNvPr id="168" name="Straight Connector 167"/>
+            <p:cNvCxnSpPr/>
+            <p:nvPr/>
+          </p:nvCxnSpPr>
+          <p:spPr>
+            <a:xfrm flipV="1">
+              <a:off x="1894107" y="2139604"/>
+              <a:ext cx="50079" cy="102062"/>
+            </a:xfrm>
+            <a:prstGeom prst="line">
+              <a:avLst/>
+            </a:prstGeom>
+            <a:effectLst/>
+          </p:spPr>
+          <p:style>
+            <a:lnRef idx="2">
+              <a:schemeClr val="accent1"/>
+            </a:lnRef>
+            <a:fillRef idx="0">
+              <a:schemeClr val="accent1"/>
+            </a:fillRef>
+            <a:effectRef idx="1">
+              <a:schemeClr val="accent1"/>
+            </a:effectRef>
+            <a:fontRef idx="minor">
+              <a:schemeClr val="tx1"/>
+            </a:fontRef>
+          </p:style>
+        </p:cxnSp>
+        <p:cxnSp>
+          <p:nvCxnSpPr>
+            <p:cNvPr id="169" name="Straight Connector 168"/>
+            <p:cNvCxnSpPr/>
+            <p:nvPr/>
+          </p:nvCxnSpPr>
+          <p:spPr>
+            <a:xfrm flipV="1">
+              <a:off x="1894107" y="1935480"/>
+              <a:ext cx="50079" cy="102062"/>
+            </a:xfrm>
+            <a:prstGeom prst="line">
+              <a:avLst/>
+            </a:prstGeom>
+            <a:effectLst/>
+          </p:spPr>
+          <p:style>
+            <a:lnRef idx="2">
+              <a:schemeClr val="accent1"/>
+            </a:lnRef>
+            <a:fillRef idx="0">
+              <a:schemeClr val="accent1"/>
+            </a:fillRef>
+            <a:effectRef idx="1">
+              <a:schemeClr val="accent1"/>
+            </a:effectRef>
+            <a:fontRef idx="minor">
+              <a:schemeClr val="tx1"/>
+            </a:fontRef>
+          </p:style>
+        </p:cxnSp>
+        <p:cxnSp>
+          <p:nvCxnSpPr>
+            <p:cNvPr id="170" name="Straight Connector 169"/>
+            <p:cNvCxnSpPr/>
+            <p:nvPr/>
+          </p:nvCxnSpPr>
+          <p:spPr>
+            <a:xfrm>
+              <a:off x="1894107" y="2037542"/>
+              <a:ext cx="50079" cy="102062"/>
+            </a:xfrm>
+            <a:prstGeom prst="line">
+              <a:avLst/>
+            </a:prstGeom>
+            <a:effectLst/>
+          </p:spPr>
+          <p:style>
+            <a:lnRef idx="2">
+              <a:schemeClr val="accent1"/>
+            </a:lnRef>
+            <a:fillRef idx="0">
+              <a:schemeClr val="accent1"/>
+            </a:fillRef>
+            <a:effectRef idx="1">
+              <a:schemeClr val="accent1"/>
+            </a:effectRef>
+            <a:fontRef idx="minor">
+              <a:schemeClr val="tx1"/>
+            </a:fontRef>
+          </p:style>
+        </p:cxnSp>
+        <p:cxnSp>
+          <p:nvCxnSpPr>
+            <p:cNvPr id="171" name="Straight Connector 170"/>
+            <p:cNvCxnSpPr/>
+            <p:nvPr/>
+          </p:nvCxnSpPr>
+          <p:spPr>
+            <a:xfrm>
+              <a:off x="1894107" y="1833417"/>
+              <a:ext cx="50079" cy="102062"/>
+            </a:xfrm>
+            <a:prstGeom prst="line">
+              <a:avLst/>
+            </a:prstGeom>
+            <a:effectLst/>
+          </p:spPr>
+          <p:style>
+            <a:lnRef idx="2">
+              <a:schemeClr val="accent1"/>
+            </a:lnRef>
+            <a:fillRef idx="0">
+              <a:schemeClr val="accent1"/>
+            </a:fillRef>
+            <a:effectRef idx="1">
+              <a:schemeClr val="accent1"/>
+            </a:effectRef>
+            <a:fontRef idx="minor">
+              <a:schemeClr val="tx1"/>
+            </a:fontRef>
+          </p:style>
+        </p:cxnSp>
+      </p:grpSp>
+      <p:sp>
+        <p:nvSpPr>
+          <p:cNvPr id="172" name="TextBox 171"/>
+          <p:cNvSpPr txBox="1"/>
+          <p:nvPr/>
+        </p:nvSpPr>
+        <p:spPr>
+          <a:xfrm>
+            <a:off x="1844844" y="1710287"/>
+            <a:ext cx="505267" cy="200055"/>
+          </a:xfrm>
+          <a:prstGeom prst="rect">
+            <a:avLst/>
+          </a:prstGeom>
+          <a:noFill/>
+        </p:spPr>
+        <p:txBody>
+          <a:bodyPr wrap="none" rtlCol="0">
+            <a:spAutoFit/>
+          </a:bodyPr>
+          <a:lstStyle/>
+          <a:p>
+            <a:r>
+              <a:rPr lang="en-US" sz="700" dirty="0" smtClean="0"/>
+              <a:t>*WMT-1</a:t>
+            </a:r>
+            <a:endParaRPr lang="en-US" sz="700" dirty="0"/>
+          </a:p>
+        </p:txBody>
+      </p:sp>
+      <p:sp>
+        <p:nvSpPr>
+          <p:cNvPr id="173" name="TextBox 172"/>
+          <p:cNvSpPr txBox="1"/>
+          <p:nvPr/>
+        </p:nvSpPr>
+        <p:spPr>
+          <a:xfrm>
+            <a:off x="1855279" y="792458"/>
+            <a:ext cx="505267" cy="200055"/>
+          </a:xfrm>
+          <a:prstGeom prst="rect">
+            <a:avLst/>
+          </a:prstGeom>
+          <a:noFill/>
+        </p:spPr>
+        <p:txBody>
+          <a:bodyPr wrap="none" rtlCol="0">
+            <a:spAutoFit/>
+          </a:bodyPr>
+          <a:lstStyle/>
+          <a:p>
+            <a:r>
+              <a:rPr lang="en-US" sz="700" dirty="0" smtClean="0"/>
+              <a:t>*WMT-6</a:t>
+            </a:r>
+            <a:endParaRPr lang="en-US" sz="700" dirty="0"/>
+          </a:p>
+        </p:txBody>
+      </p:sp>
+      <p:sp>
+        <p:nvSpPr>
+          <p:cNvPr id="174" name="TextBox 173"/>
+          <p:cNvSpPr txBox="1"/>
+          <p:nvPr/>
+        </p:nvSpPr>
+        <p:spPr>
+          <a:xfrm>
+            <a:off x="1902578" y="1092344"/>
+            <a:ext cx="502712" cy="200055"/>
+          </a:xfrm>
+          <a:prstGeom prst="rect">
+            <a:avLst/>
+          </a:prstGeom>
+          <a:noFill/>
+        </p:spPr>
+        <p:txBody>
+          <a:bodyPr wrap="none" rtlCol="0">
+            <a:spAutoFit/>
+          </a:bodyPr>
+          <a:lstStyle/>
+          <a:p>
+            <a:r>
+              <a:rPr lang="en-US" sz="700" dirty="0" smtClean="0"/>
+              <a:t>WMT-7*</a:t>
+            </a:r>
+            <a:endParaRPr lang="en-US" sz="700" dirty="0"/>
+          </a:p>
+        </p:txBody>
+      </p:sp>
+      <p:sp>
+        <p:nvSpPr>
+          <p:cNvPr id="175" name="TextBox 174"/>
+          <p:cNvSpPr txBox="1"/>
+          <p:nvPr/>
+        </p:nvSpPr>
+        <p:spPr>
+          <a:xfrm>
+            <a:off x="1834175" y="2445907"/>
+            <a:ext cx="548209" cy="200055"/>
+          </a:xfrm>
+          <a:prstGeom prst="rect">
+            <a:avLst/>
+          </a:prstGeom>
+          <a:noFill/>
+        </p:spPr>
+        <p:txBody>
+          <a:bodyPr wrap="none" rtlCol="0">
+            <a:spAutoFit/>
+          </a:bodyPr>
+          <a:lstStyle/>
+          <a:p>
+            <a:r>
+              <a:rPr lang="en-US" sz="700" dirty="0" smtClean="0"/>
+              <a:t>WMT-14*</a:t>
+            </a:r>
+            <a:endParaRPr lang="en-US" sz="700" dirty="0"/>
+          </a:p>
+        </p:txBody>
+      </p:sp>
+      <p:sp>
+        <p:nvSpPr>
+          <p:cNvPr id="176" name="TextBox 175"/>
+          <p:cNvSpPr txBox="1"/>
+          <p:nvPr/>
+        </p:nvSpPr>
+        <p:spPr>
+          <a:xfrm>
+            <a:off x="2222090" y="2335879"/>
+            <a:ext cx="556563" cy="200055"/>
+          </a:xfrm>
+          <a:prstGeom prst="rect">
+            <a:avLst/>
+          </a:prstGeom>
+          <a:noFill/>
+        </p:spPr>
+        <p:txBody>
+          <a:bodyPr wrap="none" rtlCol="0">
+            <a:spAutoFit/>
+          </a:bodyPr>
+          <a:lstStyle/>
+          <a:p>
+            <a:r>
+              <a:rPr lang="en-US" sz="700" dirty="0" smtClean="0"/>
+              <a:t>*WMT-15</a:t>
+            </a:r>
+            <a:endParaRPr lang="en-US" sz="700" dirty="0"/>
+          </a:p>
+        </p:txBody>
+      </p:sp>
+      <p:sp>
+        <p:nvSpPr>
+          <p:cNvPr id="177" name="TextBox 176"/>
+          <p:cNvSpPr txBox="1"/>
+          <p:nvPr/>
+        </p:nvSpPr>
+        <p:spPr>
+          <a:xfrm>
+            <a:off x="2231990" y="1058274"/>
+            <a:ext cx="556563" cy="200055"/>
+          </a:xfrm>
+          <a:prstGeom prst="rect">
+            <a:avLst/>
+          </a:prstGeom>
+          <a:noFill/>
+        </p:spPr>
+        <p:txBody>
+          <a:bodyPr wrap="none" rtlCol="0">
+            <a:spAutoFit/>
+          </a:bodyPr>
+          <a:lstStyle/>
+          <a:p>
+            <a:r>
+              <a:rPr lang="en-US" sz="700" dirty="0" smtClean="0"/>
+              <a:t>*WMT-21</a:t>
+            </a:r>
+            <a:endParaRPr lang="en-US" sz="700" dirty="0"/>
+          </a:p>
+        </p:txBody>
+      </p:sp>
+      <p:sp>
+        <p:nvSpPr>
+          <p:cNvPr id="178" name="TextBox 177"/>
+          <p:cNvSpPr txBox="1"/>
+          <p:nvPr/>
+        </p:nvSpPr>
+        <p:spPr>
+          <a:xfrm>
+            <a:off x="2225172" y="1388271"/>
+            <a:ext cx="548209" cy="200055"/>
+          </a:xfrm>
+          <a:prstGeom prst="rect">
+            <a:avLst/>
+          </a:prstGeom>
+          <a:noFill/>
+        </p:spPr>
+        <p:txBody>
+          <a:bodyPr wrap="none" rtlCol="0">
+            <a:spAutoFit/>
+          </a:bodyPr>
+          <a:lstStyle/>
+          <a:p>
+            <a:r>
+              <a:rPr lang="en-US" sz="700" dirty="0" smtClean="0"/>
+              <a:t>WMT-22*</a:t>
+            </a:r>
+            <a:endParaRPr lang="en-US" sz="700" dirty="0"/>
+          </a:p>
+        </p:txBody>
+      </p:sp>
+      <p:sp>
+        <p:nvSpPr>
+          <p:cNvPr id="179" name="TextBox 178"/>
+          <p:cNvSpPr txBox="1"/>
+          <p:nvPr/>
+        </p:nvSpPr>
+        <p:spPr>
+          <a:xfrm>
+            <a:off x="2245459" y="1773050"/>
+            <a:ext cx="548209" cy="200055"/>
+          </a:xfrm>
+          <a:prstGeom prst="rect">
+            <a:avLst/>
+          </a:prstGeom>
+          <a:noFill/>
+        </p:spPr>
+        <p:txBody>
+          <a:bodyPr wrap="none" rtlCol="0">
+            <a:spAutoFit/>
+          </a:bodyPr>
+          <a:lstStyle/>
+          <a:p>
+            <a:r>
+              <a:rPr lang="en-US" sz="700" dirty="0" smtClean="0"/>
+              <a:t>WMT-24*</a:t>
+            </a:r>
+            <a:endParaRPr lang="en-US" sz="700" dirty="0"/>
+          </a:p>
+        </p:txBody>
+      </p:sp>
+      <p:sp>
+        <p:nvSpPr>
+          <p:cNvPr id="180" name="TextBox 179"/>
+          <p:cNvSpPr txBox="1"/>
+          <p:nvPr/>
+        </p:nvSpPr>
+        <p:spPr>
+          <a:xfrm>
+            <a:off x="2609037" y="1683050"/>
+            <a:ext cx="543739" cy="200055"/>
+          </a:xfrm>
+          <a:prstGeom prst="rect">
+            <a:avLst/>
+          </a:prstGeom>
+          <a:noFill/>
+        </p:spPr>
+        <p:txBody>
+          <a:bodyPr wrap="none" rtlCol="0">
+            <a:spAutoFit/>
+          </a:bodyPr>
+          <a:lstStyle/>
+          <a:p>
+            <a:r>
+              <a:rPr lang="en-US" sz="700" dirty="0" smtClean="0"/>
+              <a:t>*LOUHI-1</a:t>
+            </a:r>
+            <a:endParaRPr lang="en-US" sz="700" dirty="0"/>
+          </a:p>
+        </p:txBody>
+      </p:sp>
+      <p:sp>
+        <p:nvSpPr>
+          <p:cNvPr id="181" name="TextBox 180"/>
+          <p:cNvSpPr txBox="1"/>
+          <p:nvPr/>
+        </p:nvSpPr>
+        <p:spPr>
+          <a:xfrm>
+            <a:off x="2413850" y="792855"/>
+            <a:ext cx="535673" cy="200055"/>
+          </a:xfrm>
+          <a:prstGeom prst="rect">
+            <a:avLst/>
+          </a:prstGeom>
+          <a:noFill/>
+        </p:spPr>
+        <p:txBody>
+          <a:bodyPr wrap="none" rtlCol="0">
+            <a:spAutoFit/>
+          </a:bodyPr>
+          <a:lstStyle/>
+          <a:p>
+            <a:r>
+              <a:rPr lang="en-US" sz="700" dirty="0" smtClean="0"/>
+              <a:t>LOUHI-3*</a:t>
+            </a:r>
+            <a:endParaRPr lang="en-US" sz="700" dirty="0"/>
+          </a:p>
+        </p:txBody>
+      </p:sp>
+      <p:sp>
+        <p:nvSpPr>
+          <p:cNvPr id="182" name="TextBox 181"/>
+          <p:cNvSpPr txBox="1"/>
+          <p:nvPr/>
+        </p:nvSpPr>
+        <p:spPr>
+          <a:xfrm>
+            <a:off x="2413850" y="1192371"/>
+            <a:ext cx="535673" cy="200055"/>
+          </a:xfrm>
+          <a:prstGeom prst="rect">
+            <a:avLst/>
+          </a:prstGeom>
+          <a:noFill/>
+        </p:spPr>
+        <p:txBody>
+          <a:bodyPr wrap="none" rtlCol="0">
+            <a:spAutoFit/>
+          </a:bodyPr>
+          <a:lstStyle/>
+          <a:p>
+            <a:r>
+              <a:rPr lang="en-US" sz="700" dirty="0" smtClean="0"/>
+              <a:t>LOUHI-5*</a:t>
+            </a:r>
+            <a:endParaRPr lang="en-US" sz="700" dirty="0"/>
+          </a:p>
+        </p:txBody>
+      </p:sp>
+      <p:sp>
+        <p:nvSpPr>
+          <p:cNvPr id="183" name="TextBox 182"/>
+          <p:cNvSpPr txBox="1"/>
+          <p:nvPr/>
+        </p:nvSpPr>
+        <p:spPr>
+          <a:xfrm>
+            <a:off x="2848928" y="804662"/>
+            <a:ext cx="543739" cy="200055"/>
+          </a:xfrm>
+          <a:prstGeom prst="rect">
+            <a:avLst/>
+          </a:prstGeom>
+          <a:noFill/>
+        </p:spPr>
+        <p:txBody>
+          <a:bodyPr wrap="none" rtlCol="0">
+            <a:spAutoFit/>
+          </a:bodyPr>
+          <a:lstStyle/>
+          <a:p>
+            <a:r>
+              <a:rPr lang="en-US" sz="700" dirty="0" smtClean="0"/>
+              <a:t>*LOUHI-8</a:t>
+            </a:r>
+            <a:endParaRPr lang="en-US" sz="700" dirty="0"/>
+          </a:p>
+        </p:txBody>
+      </p:sp>
+      <p:sp>
+        <p:nvSpPr>
+          <p:cNvPr id="184" name="TextBox 183"/>
+          <p:cNvSpPr txBox="1"/>
+          <p:nvPr/>
+        </p:nvSpPr>
+        <p:spPr>
+          <a:xfrm>
+            <a:off x="2843725" y="1225109"/>
+            <a:ext cx="543739" cy="200055"/>
+          </a:xfrm>
+          <a:prstGeom prst="rect">
+            <a:avLst/>
+          </a:prstGeom>
+          <a:noFill/>
+        </p:spPr>
+        <p:txBody>
+          <a:bodyPr wrap="none" rtlCol="0">
+            <a:spAutoFit/>
+          </a:bodyPr>
+          <a:lstStyle/>
+          <a:p>
+            <a:r>
+              <a:rPr lang="en-US" sz="700" dirty="0" smtClean="0"/>
+              <a:t>*LOUHI-6</a:t>
+            </a:r>
+            <a:endParaRPr lang="en-US" sz="700" dirty="0"/>
+          </a:p>
+        </p:txBody>
+      </p:sp>
+      <p:sp>
+        <p:nvSpPr>
+          <p:cNvPr id="185" name="TextBox 184"/>
+          <p:cNvSpPr txBox="1"/>
+          <p:nvPr/>
+        </p:nvSpPr>
+        <p:spPr>
+          <a:xfrm>
+            <a:off x="2678643" y="1374802"/>
+            <a:ext cx="535673" cy="200055"/>
+          </a:xfrm>
+          <a:prstGeom prst="rect">
+            <a:avLst/>
+          </a:prstGeom>
+          <a:noFill/>
+        </p:spPr>
+        <p:txBody>
+          <a:bodyPr wrap="none" rtlCol="0">
+            <a:spAutoFit/>
+          </a:bodyPr>
+          <a:lstStyle/>
+          <a:p>
+            <a:r>
+              <a:rPr lang="en-US" sz="700" dirty="0" smtClean="0"/>
+              <a:t>LOUHI-9*</a:t>
+            </a:r>
+            <a:endParaRPr lang="en-US" sz="700" dirty="0"/>
+          </a:p>
+        </p:txBody>
+      </p:sp>
+      <p:sp>
+        <p:nvSpPr>
+          <p:cNvPr id="186" name="TextBox 185"/>
+          <p:cNvSpPr txBox="1"/>
+          <p:nvPr/>
+        </p:nvSpPr>
+        <p:spPr>
+          <a:xfrm>
+            <a:off x="1844102" y="4450890"/>
+            <a:ext cx="505267" cy="200055"/>
+          </a:xfrm>
+          <a:prstGeom prst="rect">
+            <a:avLst/>
+          </a:prstGeom>
+          <a:noFill/>
+        </p:spPr>
+        <p:txBody>
+          <a:bodyPr wrap="none" rtlCol="0">
+            <a:spAutoFit/>
+          </a:bodyPr>
+          <a:lstStyle/>
+          <a:p>
+            <a:r>
+              <a:rPr lang="en-US" sz="700" dirty="0" smtClean="0"/>
+              <a:t>*Disco-1</a:t>
+            </a:r>
+            <a:endParaRPr lang="en-US" sz="700" dirty="0"/>
+          </a:p>
+        </p:txBody>
+      </p:sp>
+      <p:sp>
+        <p:nvSpPr>
+          <p:cNvPr id="187" name="TextBox 186"/>
+          <p:cNvSpPr txBox="1"/>
+          <p:nvPr/>
+        </p:nvSpPr>
+        <p:spPr>
+          <a:xfrm>
+            <a:off x="1852573" y="5414617"/>
+            <a:ext cx="505267" cy="200055"/>
+          </a:xfrm>
+          <a:prstGeom prst="rect">
+            <a:avLst/>
+          </a:prstGeom>
+          <a:noFill/>
+        </p:spPr>
+        <p:txBody>
+          <a:bodyPr wrap="none" rtlCol="0">
+            <a:spAutoFit/>
+          </a:bodyPr>
+          <a:lstStyle/>
+          <a:p>
+            <a:r>
+              <a:rPr lang="en-US" sz="700" dirty="0" smtClean="0"/>
+              <a:t>*Disco-6</a:t>
+            </a:r>
+            <a:endParaRPr lang="en-US" sz="700" dirty="0"/>
+          </a:p>
+        </p:txBody>
+      </p:sp>
+      <p:sp>
+        <p:nvSpPr>
+          <p:cNvPr id="188" name="TextBox 187"/>
+          <p:cNvSpPr txBox="1"/>
+          <p:nvPr/>
+        </p:nvSpPr>
+        <p:spPr>
+          <a:xfrm>
+            <a:off x="2732374" y="4935167"/>
+            <a:ext cx="498592" cy="200055"/>
+          </a:xfrm>
+          <a:prstGeom prst="rect">
+            <a:avLst/>
+          </a:prstGeom>
+          <a:noFill/>
+        </p:spPr>
+        <p:txBody>
+          <a:bodyPr wrap="none" rtlCol="0">
+            <a:spAutoFit/>
+          </a:bodyPr>
+          <a:lstStyle/>
+          <a:p>
+            <a:r>
+              <a:rPr lang="en-US" sz="700" dirty="0" smtClean="0"/>
+              <a:t>Disco-7*</a:t>
+            </a:r>
+            <a:endParaRPr lang="en-US" sz="700" dirty="0"/>
+          </a:p>
+        </p:txBody>
+      </p:sp>
+      <p:sp>
+        <p:nvSpPr>
+          <p:cNvPr id="189" name="TextBox 188"/>
+          <p:cNvSpPr txBox="1"/>
+          <p:nvPr/>
+        </p:nvSpPr>
+        <p:spPr>
+          <a:xfrm>
+            <a:off x="2718573" y="5351982"/>
+            <a:ext cx="498592" cy="200055"/>
+          </a:xfrm>
+          <a:prstGeom prst="rect">
+            <a:avLst/>
+          </a:prstGeom>
+          <a:noFill/>
+        </p:spPr>
+        <p:txBody>
+          <a:bodyPr wrap="none" rtlCol="0">
+            <a:spAutoFit/>
+          </a:bodyPr>
+          <a:lstStyle/>
+          <a:p>
+            <a:r>
+              <a:rPr lang="en-US" sz="700" dirty="0" smtClean="0"/>
+              <a:t>Disco-9*</a:t>
+            </a:r>
+            <a:endParaRPr lang="en-US" sz="700" dirty="0"/>
+          </a:p>
+        </p:txBody>
+      </p:sp>
+      <p:sp>
+        <p:nvSpPr>
+          <p:cNvPr id="190" name="TextBox 189"/>
+          <p:cNvSpPr txBox="1"/>
+          <p:nvPr/>
+        </p:nvSpPr>
+        <p:spPr>
+          <a:xfrm>
+            <a:off x="2671960" y="5644672"/>
+            <a:ext cx="544089" cy="200055"/>
+          </a:xfrm>
+          <a:prstGeom prst="rect">
+            <a:avLst/>
+          </a:prstGeom>
+          <a:noFill/>
+        </p:spPr>
+        <p:txBody>
+          <a:bodyPr wrap="none" rtlCol="0">
+            <a:spAutoFit/>
+          </a:bodyPr>
+          <a:lstStyle/>
+          <a:p>
+            <a:r>
+              <a:rPr lang="en-US" sz="700" dirty="0" smtClean="0"/>
+              <a:t>*Disco-10</a:t>
+            </a:r>
+            <a:endParaRPr lang="en-US" sz="700" dirty="0"/>
+          </a:p>
+        </p:txBody>
+      </p:sp>
+      <p:sp>
+        <p:nvSpPr>
+          <p:cNvPr id="191" name="TextBox 190"/>
+          <p:cNvSpPr txBox="1"/>
+          <p:nvPr/>
+        </p:nvSpPr>
+        <p:spPr>
+          <a:xfrm>
+            <a:off x="2672368" y="6062397"/>
+            <a:ext cx="544089" cy="200055"/>
+          </a:xfrm>
+          <a:prstGeom prst="rect">
+            <a:avLst/>
+          </a:prstGeom>
+          <a:noFill/>
+        </p:spPr>
+        <p:txBody>
+          <a:bodyPr wrap="none" rtlCol="0">
+            <a:spAutoFit/>
+          </a:bodyPr>
+          <a:lstStyle/>
+          <a:p>
+            <a:r>
+              <a:rPr lang="en-US" sz="700" dirty="0" smtClean="0"/>
+              <a:t>*Disco-12</a:t>
+            </a:r>
+            <a:endParaRPr lang="en-US" sz="700" dirty="0"/>
+          </a:p>
+        </p:txBody>
+      </p:sp>
+      <p:sp>
+        <p:nvSpPr>
+          <p:cNvPr id="192" name="TextBox 191"/>
+          <p:cNvSpPr txBox="1"/>
+          <p:nvPr/>
+        </p:nvSpPr>
+        <p:spPr>
+          <a:xfrm>
+            <a:off x="3661870" y="5754124"/>
+            <a:ext cx="544089" cy="200055"/>
+          </a:xfrm>
+          <a:prstGeom prst="rect">
+            <a:avLst/>
+          </a:prstGeom>
+          <a:noFill/>
+        </p:spPr>
+        <p:txBody>
+          <a:bodyPr wrap="none" rtlCol="0">
+            <a:spAutoFit/>
+          </a:bodyPr>
+          <a:lstStyle/>
+          <a:p>
+            <a:r>
+              <a:rPr lang="en-US" sz="700" dirty="0" smtClean="0"/>
+              <a:t>*Disco-13</a:t>
+            </a:r>
+            <a:endParaRPr lang="en-US" sz="700" dirty="0"/>
+          </a:p>
+        </p:txBody>
+      </p:sp>
+      <p:sp>
+        <p:nvSpPr>
+          <p:cNvPr id="193" name="TextBox 192"/>
+          <p:cNvSpPr txBox="1"/>
+          <p:nvPr/>
+        </p:nvSpPr>
+        <p:spPr>
+          <a:xfrm>
+            <a:off x="4498671" y="5734124"/>
+            <a:ext cx="544089" cy="200055"/>
+          </a:xfrm>
+          <a:prstGeom prst="rect">
+            <a:avLst/>
+          </a:prstGeom>
+          <a:noFill/>
+        </p:spPr>
+        <p:txBody>
+          <a:bodyPr wrap="none" rtlCol="0">
+            <a:spAutoFit/>
+          </a:bodyPr>
+          <a:lstStyle/>
+          <a:p>
+            <a:r>
+              <a:rPr lang="en-US" sz="700" dirty="0" smtClean="0"/>
+              <a:t>*Disco-18</a:t>
+            </a:r>
+            <a:endParaRPr lang="en-US" sz="700" dirty="0"/>
+          </a:p>
+        </p:txBody>
+      </p:sp>
+      <p:sp>
+        <p:nvSpPr>
+          <p:cNvPr id="2" name="TextBox 1"/>
+          <p:cNvSpPr txBox="1"/>
+          <p:nvPr/>
+        </p:nvSpPr>
+        <p:spPr>
+          <a:xfrm>
+            <a:off x="996432" y="8659774"/>
+            <a:ext cx="2056973" cy="954107"/>
+          </a:xfrm>
+          <a:prstGeom prst="rect">
+            <a:avLst/>
+          </a:prstGeom>
+          <a:noFill/>
+        </p:spPr>
+        <p:txBody>
+          <a:bodyPr wrap="none" rtlCol="0">
+            <a:spAutoFit/>
+          </a:bodyPr>
+          <a:lstStyle/>
+          <a:p>
+            <a:r>
+              <a:rPr lang="en-US" sz="1400" dirty="0"/>
+              <a:t>11:00-12:</a:t>
+            </a:r>
+            <a:r>
+              <a:rPr lang="en-US" sz="1400" dirty="0" smtClean="0"/>
+              <a:t>30, WMT: 24</a:t>
+            </a:r>
+          </a:p>
+          <a:p>
+            <a:r>
+              <a:rPr lang="en-US" sz="1400" dirty="0" smtClean="0"/>
+              <a:t>11</a:t>
+            </a:r>
+            <a:r>
+              <a:rPr lang="en-US" sz="1400" dirty="0"/>
+              <a:t>:00-12:30, </a:t>
+            </a:r>
+            <a:r>
+              <a:rPr lang="en-US" sz="1400" dirty="0" err="1"/>
+              <a:t>DiscoMT</a:t>
+            </a:r>
+            <a:r>
+              <a:rPr lang="en-US" sz="1400" dirty="0"/>
+              <a:t>: 18 </a:t>
+            </a:r>
+          </a:p>
+          <a:p>
+            <a:r>
+              <a:rPr lang="en-US" sz="1400" dirty="0" smtClean="0"/>
+              <a:t>11:00</a:t>
+            </a:r>
+            <a:r>
+              <a:rPr lang="en-US" sz="1400" dirty="0"/>
+              <a:t>-</a:t>
+            </a:r>
+            <a:r>
+              <a:rPr lang="en-US" sz="1400" dirty="0" smtClean="0"/>
+              <a:t>12:30, LOUHI: 11</a:t>
+            </a:r>
+          </a:p>
+          <a:p>
+            <a:r>
+              <a:rPr lang="en-US" sz="1400" dirty="0"/>
+              <a:t>17:30-19:20, WASSA: </a:t>
+            </a:r>
+            <a:r>
+              <a:rPr lang="en-US" sz="1400" dirty="0" smtClean="0"/>
+              <a:t>13</a:t>
+            </a:r>
+            <a:endParaRPr lang="en-US" sz="1400" dirty="0"/>
+          </a:p>
+        </p:txBody>
+      </p:sp>
+      <p:sp>
+        <p:nvSpPr>
+          <p:cNvPr id="109" name="TextBox 108"/>
+          <p:cNvSpPr txBox="1"/>
+          <p:nvPr/>
+        </p:nvSpPr>
+        <p:spPr>
+          <a:xfrm>
+            <a:off x="4136095" y="8659774"/>
+            <a:ext cx="2005677" cy="954107"/>
+          </a:xfrm>
+          <a:prstGeom prst="rect">
+            <a:avLst/>
+          </a:prstGeom>
+          <a:noFill/>
+        </p:spPr>
+        <p:txBody>
+          <a:bodyPr wrap="none" rtlCol="0">
+            <a:spAutoFit/>
+          </a:bodyPr>
+          <a:lstStyle/>
+          <a:p>
+            <a:r>
+              <a:rPr lang="en-US" sz="1400" dirty="0"/>
+              <a:t>11:00-12:</a:t>
+            </a:r>
+            <a:r>
+              <a:rPr lang="en-US" sz="1400" dirty="0" smtClean="0"/>
+              <a:t>30, WMT: 22</a:t>
+            </a:r>
+          </a:p>
+          <a:p>
+            <a:r>
+              <a:rPr lang="en-US" sz="1400" dirty="0" smtClean="0"/>
+              <a:t>12:15-14:00, VL: 11</a:t>
+            </a:r>
+          </a:p>
+          <a:p>
+            <a:r>
+              <a:rPr lang="en-US" sz="1400" dirty="0"/>
+              <a:t>12:10-13:00, </a:t>
+            </a:r>
+            <a:r>
+              <a:rPr lang="en-US" sz="1400" dirty="0" err="1"/>
+              <a:t>CogACLL</a:t>
+            </a:r>
+            <a:r>
+              <a:rPr lang="en-US" sz="1400" dirty="0"/>
+              <a:t>: 6</a:t>
+            </a:r>
+          </a:p>
+          <a:p>
+            <a:r>
+              <a:rPr lang="en-US" sz="1400" dirty="0" smtClean="0"/>
+              <a:t>15:10-16:00, </a:t>
+            </a:r>
+            <a:r>
+              <a:rPr lang="en-US" sz="1400" dirty="0" err="1" smtClean="0"/>
+              <a:t>LSDSem</a:t>
+            </a:r>
+            <a:r>
+              <a:rPr lang="en-US" sz="1400" dirty="0" smtClean="0"/>
+              <a:t>: 12</a:t>
+            </a:r>
+          </a:p>
+        </p:txBody>
+      </p:sp>
+      <p:sp>
+        <p:nvSpPr>
+          <p:cNvPr id="112" name="TextBox 111"/>
+          <p:cNvSpPr txBox="1"/>
+          <p:nvPr/>
+        </p:nvSpPr>
+        <p:spPr>
+          <a:xfrm>
+            <a:off x="788004" y="8425887"/>
+            <a:ext cx="1968458" cy="307777"/>
+          </a:xfrm>
+          <a:prstGeom prst="rect">
+            <a:avLst/>
+          </a:prstGeom>
+          <a:noFill/>
+        </p:spPr>
+        <p:txBody>
+          <a:bodyPr wrap="none" rtlCol="0">
+            <a:spAutoFit/>
+          </a:bodyPr>
+          <a:lstStyle/>
+          <a:p>
+            <a:pPr algn="ctr"/>
+            <a:r>
+              <a:rPr lang="en-US" sz="1400" dirty="0" smtClean="0"/>
+              <a:t>Thursday, September 19</a:t>
+            </a:r>
+            <a:endParaRPr lang="en-US" sz="1400" dirty="0"/>
+          </a:p>
+        </p:txBody>
+      </p:sp>
+      <p:sp>
+        <p:nvSpPr>
+          <p:cNvPr id="116" name="TextBox 115"/>
+          <p:cNvSpPr txBox="1"/>
+          <p:nvPr/>
+        </p:nvSpPr>
+        <p:spPr>
+          <a:xfrm>
+            <a:off x="3867571" y="8413565"/>
+            <a:ext cx="1749197" cy="307777"/>
+          </a:xfrm>
+          <a:prstGeom prst="rect">
+            <a:avLst/>
+          </a:prstGeom>
+          <a:noFill/>
+        </p:spPr>
+        <p:txBody>
+          <a:bodyPr wrap="none" rtlCol="0">
+            <a:spAutoFit/>
+          </a:bodyPr>
+          <a:lstStyle/>
+          <a:p>
+            <a:pPr algn="ctr"/>
+            <a:r>
+              <a:rPr lang="en-US" sz="1400" dirty="0" smtClean="0"/>
+              <a:t>Friday, September 20</a:t>
+            </a:r>
+            <a:endParaRPr lang="en-US" sz="1400" dirty="0"/>
+          </a:p>
+        </p:txBody>
+      </p:sp>
+      <p:sp>
+        <p:nvSpPr>
+          <p:cNvPr id="194" name="TextBox 193"/>
+          <p:cNvSpPr txBox="1"/>
+          <p:nvPr/>
+        </p:nvSpPr>
+        <p:spPr>
+          <a:xfrm>
+            <a:off x="2684613" y="1773077"/>
+            <a:ext cx="581171" cy="200055"/>
+          </a:xfrm>
+          <a:prstGeom prst="rect">
+            <a:avLst/>
+          </a:prstGeom>
+          <a:noFill/>
+        </p:spPr>
+        <p:txBody>
+          <a:bodyPr wrap="none" rtlCol="0">
+            <a:spAutoFit/>
+          </a:bodyPr>
+          <a:lstStyle/>
+          <a:p>
+            <a:r>
+              <a:rPr lang="en-US" sz="700" dirty="0" smtClean="0"/>
+              <a:t>LOUHI-11*</a:t>
+            </a:r>
+            <a:endParaRPr lang="en-US" sz="700" dirty="0"/>
+          </a:p>
+        </p:txBody>
+      </p:sp>
+      <p:sp>
+        <p:nvSpPr>
+          <p:cNvPr id="195" name="TextBox 194"/>
+          <p:cNvSpPr txBox="1"/>
+          <p:nvPr/>
+        </p:nvSpPr>
+        <p:spPr>
+          <a:xfrm>
+            <a:off x="1784870" y="1793077"/>
+            <a:ext cx="569387" cy="200055"/>
+          </a:xfrm>
+          <a:prstGeom prst="rect">
+            <a:avLst/>
+          </a:prstGeom>
+          <a:noFill/>
+        </p:spPr>
+        <p:txBody>
+          <a:bodyPr wrap="none" rtlCol="0">
+            <a:spAutoFit/>
+          </a:bodyPr>
+          <a:lstStyle/>
+          <a:p>
+            <a:r>
+              <a:rPr lang="en-US" sz="700" dirty="0" smtClean="0"/>
+              <a:t>*WASSA-1</a:t>
+            </a:r>
+            <a:endParaRPr lang="en-US" sz="700" dirty="0"/>
+          </a:p>
+        </p:txBody>
+      </p:sp>
+    </p:spTree>
+    <p:extLst>
+      <p:ext uri="{BB962C8B-B14F-4D97-AF65-F5344CB8AC3E}">
+        <p14:creationId xmlns:p14="http://schemas.microsoft.com/office/powerpoint/2010/main" val="2633859471"/>
+      </p:ext>
+    </p:extLst>
+  </p:cSld>
+  <p:clrMapOvr>
+    <a:masterClrMapping/>
+  </p:clrMapOvr>
+</p:sld>
+</file>
+
+<file path=ppt/slides/slide3.xml><?xml version="1.0" encoding="utf-8"?>
 <p:sld xmlns:a="http://schemas.openxmlformats.org/drawingml/2006/main" xmlns:r="http://schemas.openxmlformats.org/officeDocument/2006/relationships" xmlns:p="http://schemas.openxmlformats.org/presentationml/2006/main">
   <p:cSld>
     <p:spTree>

</xml_diff>